<commit_message>
Final version of presentation. Need to add feedback.
</commit_message>
<xml_diff>
--- a/Presentations/February 10, 2014/Bridge Tester.pptx
+++ b/Presentations/February 10, 2014/Bridge Tester.pptx
@@ -19,8 +19,8 @@
     <p:sldId id="272" r:id="rId10"/>
     <p:sldId id="264" r:id="rId11"/>
     <p:sldId id="276" r:id="rId12"/>
-    <p:sldId id="260" r:id="rId13"/>
-    <p:sldId id="275" r:id="rId14"/>
+    <p:sldId id="275" r:id="rId13"/>
+    <p:sldId id="260" r:id="rId14"/>
     <p:sldId id="262" r:id="rId15"/>
     <p:sldId id="265" r:id="rId16"/>
     <p:sldId id="277" r:id="rId17"/>
@@ -349,7 +349,7 @@
           <a:p>
             <a:fld id="{A0186D4C-ED66-467E-8C14-E23FF42A19B1}" type="datetimeFigureOut">
               <a:rPr lang="en-US" smtClean="0"/>
-              <a:t>2/9/2014</a:t>
+              <a:t>2/10/2014</a:t>
             </a:fld>
             <a:endParaRPr lang="en-US"/>
           </a:p>
@@ -710,9 +710,615 @@
                 <a:ea typeface="+mn-ea"/>
                 <a:cs typeface="+mn-cs"/>
               </a:rPr>
-              <a:t>We will discuss the background of our project and the course goals. We will also go over our solution to the selected project and show our system diagram. Areas of responsibility will be reviewed as well as a preliminary timeline and rough budget.</a:t>
+              <a:t>We will discuss the background of our project and the course goals. We will also go over our solution to the selected project and show our system diagram. Areas of responsibility will be reviewed as well as a timeline and budget.</a:t>
             </a:r>
             <a:endParaRPr dirty="0"/>
+          </a:p>
+        </p:txBody>
+      </p:sp>
+    </p:spTree>
+  </p:cSld>
+  <p:clrMapOvr>
+    <a:masterClrMapping/>
+  </p:clrMapOvr>
+</p:notes>
+</file>
+
+<file path=ppt/notesSlides/notesSlide10.xml><?xml version="1.0" encoding="utf-8"?>
+<p:notes xmlns:a="http://schemas.openxmlformats.org/drawingml/2006/main" xmlns:r="http://schemas.openxmlformats.org/officeDocument/2006/relationships" xmlns:p="http://schemas.openxmlformats.org/presentationml/2006/main">
+  <p:cSld>
+    <p:spTree>
+      <p:nvGrpSpPr>
+        <p:cNvPr id="1" name=""/>
+        <p:cNvGrpSpPr/>
+        <p:nvPr/>
+      </p:nvGrpSpPr>
+      <p:grpSpPr>
+        <a:xfrm>
+          <a:off x="0" y="0"/>
+          <a:ext cx="0" cy="0"/>
+          <a:chOff x="0" y="0"/>
+          <a:chExt cx="0" cy="0"/>
+        </a:xfrm>
+      </p:grpSpPr>
+      <p:sp>
+        <p:nvSpPr>
+          <p:cNvPr id="2" name="Slide Image Placeholder 1"/>
+          <p:cNvSpPr>
+            <a:spLocks noGrp="1" noRot="1" noChangeAspect="1"/>
+          </p:cNvSpPr>
+          <p:nvPr>
+            <p:ph type="sldImg"/>
+          </p:nvPr>
+        </p:nvSpPr>
+        <p:spPr/>
+      </p:sp>
+      <p:sp>
+        <p:nvSpPr>
+          <p:cNvPr id="3" name="Notes Placeholder 2"/>
+          <p:cNvSpPr>
+            <a:spLocks noGrp="1"/>
+          </p:cNvSpPr>
+          <p:nvPr>
+            <p:ph type="body" idx="1"/>
+          </p:nvPr>
+        </p:nvSpPr>
+        <p:spPr/>
+        <p:txBody>
+          <a:bodyPr/>
+          <a:lstStyle/>
+          <a:p>
+            <a:r>
+              <a:rPr lang="en-US" dirty="0" smtClean="0"/>
+              <a:t>Our hydraulic system has</a:t>
+            </a:r>
+            <a:r>
+              <a:rPr lang="en-US" baseline="0" dirty="0" smtClean="0"/>
+              <a:t> is manually operated and has active extend and retract states. It is capable of outputting between 2K-3Ksi of pressure. It has a return tank and a gear pump with a manual handle.</a:t>
+            </a:r>
+            <a:endParaRPr lang="en-US" dirty="0"/>
+          </a:p>
+        </p:txBody>
+      </p:sp>
+      <p:sp>
+        <p:nvSpPr>
+          <p:cNvPr id="4" name="Slide Number Placeholder 3"/>
+          <p:cNvSpPr>
+            <a:spLocks noGrp="1"/>
+          </p:cNvSpPr>
+          <p:nvPr>
+            <p:ph type="sldNum" sz="quarter" idx="10"/>
+          </p:nvPr>
+        </p:nvSpPr>
+        <p:spPr/>
+        <p:txBody>
+          <a:bodyPr/>
+          <a:lstStyle/>
+          <a:p>
+            <a:fld id="{61B1FFEF-BEF9-4EE0-94EC-51761DE7F5D7}" type="slidenum">
+              <a:rPr lang="en-US" smtClean="0"/>
+              <a:t>12</a:t>
+            </a:fld>
+            <a:endParaRPr lang="en-US"/>
+          </a:p>
+        </p:txBody>
+      </p:sp>
+    </p:spTree>
+    <p:extLst>
+      <p:ext uri="{BB962C8B-B14F-4D97-AF65-F5344CB8AC3E}">
+        <p14:creationId xmlns:p14="http://schemas.microsoft.com/office/powerpoint/2010/main" val="812374525"/>
+      </p:ext>
+    </p:extLst>
+  </p:cSld>
+  <p:clrMapOvr>
+    <a:masterClrMapping/>
+  </p:clrMapOvr>
+</p:notes>
+</file>
+
+<file path=ppt/notesSlides/notesSlide11.xml><?xml version="1.0" encoding="utf-8"?>
+<p:notes xmlns:a="http://schemas.openxmlformats.org/drawingml/2006/main" xmlns:r="http://schemas.openxmlformats.org/officeDocument/2006/relationships" xmlns:p="http://schemas.openxmlformats.org/presentationml/2006/main">
+  <p:cSld>
+    <p:spTree>
+      <p:nvGrpSpPr>
+        <p:cNvPr id="1" name=""/>
+        <p:cNvGrpSpPr/>
+        <p:nvPr/>
+      </p:nvGrpSpPr>
+      <p:grpSpPr>
+        <a:xfrm>
+          <a:off x="0" y="0"/>
+          <a:ext cx="0" cy="0"/>
+          <a:chOff x="0" y="0"/>
+          <a:chExt cx="0" cy="0"/>
+        </a:xfrm>
+      </p:grpSpPr>
+      <p:sp>
+        <p:nvSpPr>
+          <p:cNvPr id="2" name="Slide Image Placeholder 1"/>
+          <p:cNvSpPr>
+            <a:spLocks noGrp="1" noRot="1" noChangeAspect="1"/>
+          </p:cNvSpPr>
+          <p:nvPr>
+            <p:ph type="sldImg"/>
+          </p:nvPr>
+        </p:nvSpPr>
+        <p:spPr/>
+      </p:sp>
+      <p:sp>
+        <p:nvSpPr>
+          <p:cNvPr id="3" name="Notes Placeholder 2"/>
+          <p:cNvSpPr>
+            <a:spLocks noGrp="1"/>
+          </p:cNvSpPr>
+          <p:nvPr>
+            <p:ph type="body" idx="1"/>
+          </p:nvPr>
+        </p:nvSpPr>
+        <p:spPr/>
+        <p:txBody>
+          <a:bodyPr/>
+          <a:lstStyle/>
+          <a:p>
+            <a:r>
+              <a:rPr lang="en-US" dirty="0" smtClean="0"/>
+              <a:t>The frame</a:t>
+            </a:r>
+            <a:r>
+              <a:rPr lang="en-US" baseline="0" dirty="0" smtClean="0"/>
+              <a:t> is the structure that everything else is built on with this project. The above frame on the left shows the structure under maximum load with very exaggerated displacement visuals. There are a few more beams to be added to the frame but we are waiting on other key parts to fabricate mounting requirements after measurements.</a:t>
+            </a:r>
+            <a:endParaRPr lang="en-US" dirty="0"/>
+          </a:p>
+        </p:txBody>
+      </p:sp>
+      <p:sp>
+        <p:nvSpPr>
+          <p:cNvPr id="4" name="Slide Number Placeholder 3"/>
+          <p:cNvSpPr>
+            <a:spLocks noGrp="1"/>
+          </p:cNvSpPr>
+          <p:nvPr>
+            <p:ph type="sldNum" sz="quarter" idx="10"/>
+          </p:nvPr>
+        </p:nvSpPr>
+        <p:spPr/>
+        <p:txBody>
+          <a:bodyPr/>
+          <a:lstStyle/>
+          <a:p>
+            <a:fld id="{61B1FFEF-BEF9-4EE0-94EC-51761DE7F5D7}" type="slidenum">
+              <a:rPr lang="en-US" smtClean="0"/>
+              <a:t>13</a:t>
+            </a:fld>
+            <a:endParaRPr lang="en-US"/>
+          </a:p>
+        </p:txBody>
+      </p:sp>
+    </p:spTree>
+    <p:extLst>
+      <p:ext uri="{BB962C8B-B14F-4D97-AF65-F5344CB8AC3E}">
+        <p14:creationId xmlns:p14="http://schemas.microsoft.com/office/powerpoint/2010/main" val="2301076174"/>
+      </p:ext>
+    </p:extLst>
+  </p:cSld>
+  <p:clrMapOvr>
+    <a:masterClrMapping/>
+  </p:clrMapOvr>
+</p:notes>
+</file>
+
+<file path=ppt/notesSlides/notesSlide12.xml><?xml version="1.0" encoding="utf-8"?>
+<p:notes xmlns:a="http://schemas.openxmlformats.org/drawingml/2006/main" xmlns:r="http://schemas.openxmlformats.org/officeDocument/2006/relationships" xmlns:p="http://schemas.openxmlformats.org/presentationml/2006/main">
+  <p:cSld>
+    <p:spTree>
+      <p:nvGrpSpPr>
+        <p:cNvPr id="1" name=""/>
+        <p:cNvGrpSpPr/>
+        <p:nvPr/>
+      </p:nvGrpSpPr>
+      <p:grpSpPr>
+        <a:xfrm>
+          <a:off x="0" y="0"/>
+          <a:ext cx="0" cy="0"/>
+          <a:chOff x="0" y="0"/>
+          <a:chExt cx="0" cy="0"/>
+        </a:xfrm>
+      </p:grpSpPr>
+      <p:sp>
+        <p:nvSpPr>
+          <p:cNvPr id="2" name="Slide Image Placeholder 1"/>
+          <p:cNvSpPr>
+            <a:spLocks noGrp="1" noRot="1" noChangeAspect="1"/>
+          </p:cNvSpPr>
+          <p:nvPr>
+            <p:ph type="sldImg"/>
+          </p:nvPr>
+        </p:nvSpPr>
+        <p:spPr/>
+      </p:sp>
+      <p:sp>
+        <p:nvSpPr>
+          <p:cNvPr id="3" name="Notes Placeholder 2"/>
+          <p:cNvSpPr>
+            <a:spLocks noGrp="1"/>
+          </p:cNvSpPr>
+          <p:nvPr>
+            <p:ph type="body" idx="1"/>
+          </p:nvPr>
+        </p:nvSpPr>
+        <p:spPr/>
+        <p:txBody>
+          <a:bodyPr/>
+          <a:lstStyle/>
+          <a:p>
+            <a:r>
+              <a:rPr lang="en-US" dirty="0" smtClean="0"/>
+              <a:t>This</a:t>
+            </a:r>
+            <a:r>
+              <a:rPr lang="en-US" baseline="0" dirty="0" smtClean="0"/>
+              <a:t> is the I2C 7-Segment display in it’s pure electrical schematic. The I2C chip used has the power required to operate 7-Segment display with the 12V power. The display it’s self is a 4in digit with 5 of these digits to vividly display the maximum load value.</a:t>
+            </a:r>
+            <a:endParaRPr lang="en-US" dirty="0"/>
+          </a:p>
+        </p:txBody>
+      </p:sp>
+      <p:sp>
+        <p:nvSpPr>
+          <p:cNvPr id="4" name="Slide Number Placeholder 3"/>
+          <p:cNvSpPr>
+            <a:spLocks noGrp="1"/>
+          </p:cNvSpPr>
+          <p:nvPr>
+            <p:ph type="sldNum" sz="quarter" idx="10"/>
+          </p:nvPr>
+        </p:nvSpPr>
+        <p:spPr/>
+        <p:txBody>
+          <a:bodyPr/>
+          <a:lstStyle/>
+          <a:p>
+            <a:fld id="{61B1FFEF-BEF9-4EE0-94EC-51761DE7F5D7}" type="slidenum">
+              <a:rPr lang="en-US" smtClean="0"/>
+              <a:t>14</a:t>
+            </a:fld>
+            <a:endParaRPr lang="en-US"/>
+          </a:p>
+        </p:txBody>
+      </p:sp>
+    </p:spTree>
+    <p:extLst>
+      <p:ext uri="{BB962C8B-B14F-4D97-AF65-F5344CB8AC3E}">
+        <p14:creationId xmlns:p14="http://schemas.microsoft.com/office/powerpoint/2010/main" val="514938685"/>
+      </p:ext>
+    </p:extLst>
+  </p:cSld>
+  <p:clrMapOvr>
+    <a:masterClrMapping/>
+  </p:clrMapOvr>
+</p:notes>
+</file>
+
+<file path=ppt/notesSlides/notesSlide13.xml><?xml version="1.0" encoding="utf-8"?>
+<p:notes xmlns:a="http://schemas.openxmlformats.org/drawingml/2006/main" xmlns:r="http://schemas.openxmlformats.org/officeDocument/2006/relationships" xmlns:p="http://schemas.openxmlformats.org/presentationml/2006/main">
+  <p:cSld>
+    <p:spTree>
+      <p:nvGrpSpPr>
+        <p:cNvPr id="1" name=""/>
+        <p:cNvGrpSpPr/>
+        <p:nvPr/>
+      </p:nvGrpSpPr>
+      <p:grpSpPr>
+        <a:xfrm>
+          <a:off x="0" y="0"/>
+          <a:ext cx="0" cy="0"/>
+          <a:chOff x="0" y="0"/>
+          <a:chExt cx="0" cy="0"/>
+        </a:xfrm>
+      </p:grpSpPr>
+      <p:sp>
+        <p:nvSpPr>
+          <p:cNvPr id="2" name="Slide Image Placeholder 1"/>
+          <p:cNvSpPr>
+            <a:spLocks noGrp="1" noRot="1" noChangeAspect="1"/>
+          </p:cNvSpPr>
+          <p:nvPr>
+            <p:ph type="sldImg"/>
+          </p:nvPr>
+        </p:nvSpPr>
+        <p:spPr/>
+      </p:sp>
+      <p:sp>
+        <p:nvSpPr>
+          <p:cNvPr id="3" name="Notes Placeholder 2"/>
+          <p:cNvSpPr>
+            <a:spLocks noGrp="1"/>
+          </p:cNvSpPr>
+          <p:nvPr>
+            <p:ph type="body" idx="1"/>
+          </p:nvPr>
+        </p:nvSpPr>
+        <p:spPr/>
+        <p:txBody>
+          <a:bodyPr/>
+          <a:lstStyle/>
+          <a:p>
+            <a:r>
+              <a:rPr lang="en-US" dirty="0" smtClean="0"/>
+              <a:t>The budget</a:t>
+            </a:r>
+            <a:r>
+              <a:rPr lang="en-US" baseline="0" dirty="0" smtClean="0"/>
+              <a:t> is finished and there are a lot of parts to be ordered starting this week. Testing has begun on some smaller subsystems such as the A2D converter.</a:t>
+            </a:r>
+            <a:endParaRPr lang="en-US" dirty="0"/>
+          </a:p>
+        </p:txBody>
+      </p:sp>
+      <p:sp>
+        <p:nvSpPr>
+          <p:cNvPr id="4" name="Slide Number Placeholder 3"/>
+          <p:cNvSpPr>
+            <a:spLocks noGrp="1"/>
+          </p:cNvSpPr>
+          <p:nvPr>
+            <p:ph type="sldNum" sz="quarter" idx="10"/>
+          </p:nvPr>
+        </p:nvSpPr>
+        <p:spPr/>
+        <p:txBody>
+          <a:bodyPr/>
+          <a:lstStyle/>
+          <a:p>
+            <a:fld id="{61B1FFEF-BEF9-4EE0-94EC-51761DE7F5D7}" type="slidenum">
+              <a:rPr lang="en-US" smtClean="0"/>
+              <a:t>15</a:t>
+            </a:fld>
+            <a:endParaRPr lang="en-US"/>
+          </a:p>
+        </p:txBody>
+      </p:sp>
+    </p:spTree>
+    <p:extLst>
+      <p:ext uri="{BB962C8B-B14F-4D97-AF65-F5344CB8AC3E}">
+        <p14:creationId xmlns:p14="http://schemas.microsoft.com/office/powerpoint/2010/main" val="2126323374"/>
+      </p:ext>
+    </p:extLst>
+  </p:cSld>
+  <p:clrMapOvr>
+    <a:masterClrMapping/>
+  </p:clrMapOvr>
+</p:notes>
+</file>
+
+<file path=ppt/notesSlides/notesSlide14.xml><?xml version="1.0" encoding="utf-8"?>
+<p:notes xmlns:a="http://schemas.openxmlformats.org/drawingml/2006/main" xmlns:r="http://schemas.openxmlformats.org/officeDocument/2006/relationships" xmlns:p="http://schemas.openxmlformats.org/presentationml/2006/main" showMasterSp="0" showMasterPhAnim="0">
+  <p:cSld>
+    <p:spTree>
+      <p:nvGrpSpPr>
+        <p:cNvPr id="1" name="Shape 80"/>
+        <p:cNvGrpSpPr/>
+        <p:nvPr/>
+      </p:nvGrpSpPr>
+      <p:grpSpPr>
+        <a:xfrm>
+          <a:off x="0" y="0"/>
+          <a:ext cx="0" cy="0"/>
+          <a:chOff x="0" y="0"/>
+          <a:chExt cx="0" cy="0"/>
+        </a:xfrm>
+      </p:grpSpPr>
+      <p:sp>
+        <p:nvSpPr>
+          <p:cNvPr id="81" name="Shape 81"/>
+          <p:cNvSpPr>
+            <a:spLocks noGrp="1" noRot="1" noChangeAspect="1"/>
+          </p:cNvSpPr>
+          <p:nvPr>
+            <p:ph type="sldImg" idx="2"/>
+          </p:nvPr>
+        </p:nvSpPr>
+        <p:spPr>
+          <a:xfrm>
+            <a:off x="1143000" y="685800"/>
+            <a:ext cx="4572000" cy="3429000"/>
+          </a:xfrm>
+          <a:custGeom>
+            <a:avLst/>
+            <a:gdLst/>
+            <a:ahLst/>
+            <a:cxnLst/>
+            <a:rect l="0" t="0" r="0" b="0"/>
+            <a:pathLst>
+              <a:path w="120000" h="120000" extrusionOk="0">
+                <a:moveTo>
+                  <a:pt x="0" y="0"/>
+                </a:moveTo>
+                <a:lnTo>
+                  <a:pt x="120000" y="0"/>
+                </a:lnTo>
+                <a:lnTo>
+                  <a:pt x="120000" y="120000"/>
+                </a:lnTo>
+                <a:lnTo>
+                  <a:pt x="0" y="120000"/>
+                </a:lnTo>
+                <a:close/>
+              </a:path>
+            </a:pathLst>
+          </a:custGeom>
+        </p:spPr>
+      </p:sp>
+      <p:sp>
+        <p:nvSpPr>
+          <p:cNvPr id="82" name="Shape 82"/>
+          <p:cNvSpPr txBox="1">
+            <a:spLocks noGrp="1"/>
+          </p:cNvSpPr>
+          <p:nvPr>
+            <p:ph type="body" idx="1"/>
+          </p:nvPr>
+        </p:nvSpPr>
+        <p:spPr>
+          <a:xfrm>
+            <a:off x="685800" y="4343400"/>
+            <a:ext cx="5486399" cy="4114800"/>
+          </a:xfrm>
+          <a:prstGeom prst="rect">
+            <a:avLst/>
+          </a:prstGeom>
+        </p:spPr>
+        <p:txBody>
+          <a:bodyPr lIns="91425" tIns="91425" rIns="91425" bIns="91425" anchor="t" anchorCtr="0">
+            <a:noAutofit/>
+          </a:bodyPr>
+          <a:lstStyle/>
+          <a:p>
+            <a:r>
+              <a:rPr lang="en-US" sz="1200" b="0" i="0" u="none" strike="noStrike" kern="1200" dirty="0" smtClean="0">
+                <a:solidFill>
+                  <a:schemeClr val="tx1"/>
+                </a:solidFill>
+                <a:effectLst/>
+                <a:latin typeface="+mn-lt"/>
+                <a:ea typeface="+mn-ea"/>
+                <a:cs typeface="+mn-cs"/>
+              </a:rPr>
+              <a:t>Our project fulfills all of the requirements for the class. It has the required amount of mechanical, electrical, and software specifications. Our design fulfills the specifications of Mr. </a:t>
+            </a:r>
+            <a:r>
+              <a:rPr lang="en-US" sz="1200" b="0" i="0" u="none" strike="noStrike" kern="1200" dirty="0" err="1" smtClean="0">
+                <a:solidFill>
+                  <a:schemeClr val="tx1"/>
+                </a:solidFill>
+                <a:effectLst/>
+                <a:latin typeface="+mn-lt"/>
+                <a:ea typeface="+mn-ea"/>
+                <a:cs typeface="+mn-cs"/>
+              </a:rPr>
+              <a:t>Diebolds</a:t>
+            </a:r>
+            <a:r>
+              <a:rPr lang="en-US" sz="1200" b="0" i="0" u="none" strike="noStrike" kern="1200" dirty="0" smtClean="0">
+                <a:solidFill>
+                  <a:schemeClr val="tx1"/>
+                </a:solidFill>
+                <a:effectLst/>
+                <a:latin typeface="+mn-lt"/>
+                <a:ea typeface="+mn-ea"/>
+                <a:cs typeface="+mn-cs"/>
+              </a:rPr>
+              <a:t> the client. </a:t>
+            </a:r>
+            <a:r>
+              <a:rPr lang="en-US" sz="1200" b="0" i="0" u="none" strike="noStrike" kern="1200" smtClean="0">
+                <a:solidFill>
+                  <a:schemeClr val="tx1"/>
+                </a:solidFill>
+                <a:effectLst/>
+                <a:latin typeface="+mn-lt"/>
+                <a:ea typeface="+mn-ea"/>
+                <a:cs typeface="+mn-cs"/>
+              </a:rPr>
+              <a:t>Our project will be able to be constructed in a timely fashion and will fall within our budget constraints.</a:t>
+            </a:r>
+            <a:endParaRPr/>
+          </a:p>
+        </p:txBody>
+      </p:sp>
+    </p:spTree>
+  </p:cSld>
+  <p:clrMapOvr>
+    <a:masterClrMapping/>
+  </p:clrMapOvr>
+</p:notes>
+</file>
+
+<file path=ppt/notesSlides/notesSlide15.xml><?xml version="1.0" encoding="utf-8"?>
+<p:notes xmlns:a="http://schemas.openxmlformats.org/drawingml/2006/main" xmlns:r="http://schemas.openxmlformats.org/officeDocument/2006/relationships" xmlns:p="http://schemas.openxmlformats.org/presentationml/2006/main" showMasterSp="0" showMasterPhAnim="0">
+  <p:cSld>
+    <p:spTree>
+      <p:nvGrpSpPr>
+        <p:cNvPr id="1" name="Shape 80"/>
+        <p:cNvGrpSpPr/>
+        <p:nvPr/>
+      </p:nvGrpSpPr>
+      <p:grpSpPr>
+        <a:xfrm>
+          <a:off x="0" y="0"/>
+          <a:ext cx="0" cy="0"/>
+          <a:chOff x="0" y="0"/>
+          <a:chExt cx="0" cy="0"/>
+        </a:xfrm>
+      </p:grpSpPr>
+      <p:sp>
+        <p:nvSpPr>
+          <p:cNvPr id="81" name="Shape 81"/>
+          <p:cNvSpPr>
+            <a:spLocks noGrp="1" noRot="1" noChangeAspect="1"/>
+          </p:cNvSpPr>
+          <p:nvPr>
+            <p:ph type="sldImg" idx="2"/>
+          </p:nvPr>
+        </p:nvSpPr>
+        <p:spPr>
+          <a:xfrm>
+            <a:off x="1143000" y="685800"/>
+            <a:ext cx="4572000" cy="3429000"/>
+          </a:xfrm>
+          <a:custGeom>
+            <a:avLst/>
+            <a:gdLst/>
+            <a:ahLst/>
+            <a:cxnLst/>
+            <a:rect l="0" t="0" r="0" b="0"/>
+            <a:pathLst>
+              <a:path w="120000" h="120000" extrusionOk="0">
+                <a:moveTo>
+                  <a:pt x="0" y="0"/>
+                </a:moveTo>
+                <a:lnTo>
+                  <a:pt x="120000" y="0"/>
+                </a:lnTo>
+                <a:lnTo>
+                  <a:pt x="120000" y="120000"/>
+                </a:lnTo>
+                <a:lnTo>
+                  <a:pt x="0" y="120000"/>
+                </a:lnTo>
+                <a:close/>
+              </a:path>
+            </a:pathLst>
+          </a:custGeom>
+        </p:spPr>
+      </p:sp>
+      <p:sp>
+        <p:nvSpPr>
+          <p:cNvPr id="82" name="Shape 82"/>
+          <p:cNvSpPr txBox="1">
+            <a:spLocks noGrp="1"/>
+          </p:cNvSpPr>
+          <p:nvPr>
+            <p:ph type="body" idx="1"/>
+          </p:nvPr>
+        </p:nvSpPr>
+        <p:spPr>
+          <a:xfrm>
+            <a:off x="685800" y="4343400"/>
+            <a:ext cx="5486399" cy="4114800"/>
+          </a:xfrm>
+          <a:prstGeom prst="rect">
+            <a:avLst/>
+          </a:prstGeom>
+        </p:spPr>
+        <p:txBody>
+          <a:bodyPr lIns="91425" tIns="91425" rIns="91425" bIns="91425" anchor="t" anchorCtr="0">
+            <a:noAutofit/>
+          </a:bodyPr>
+          <a:lstStyle/>
+          <a:p>
+            <a:endParaRPr/>
           </a:p>
         </p:txBody>
       </p:sp>
@@ -820,7 +1426,7 @@
                 <a:ea typeface="+mn-ea"/>
                 <a:cs typeface="+mn-cs"/>
               </a:rPr>
-              <a:t>This course is a year long course spread over the two senior semesters. We were tasked with picking a project from a list. For our projects we must communicate with our clients and create a design that fulfills the design requirements. As the project progresses and matures, meetings with the clients will continue to show progress and address concerns. The design will be revised to reflect the changes that the client requests. At the end of April the projects will be demonstrated and presented.</a:t>
+              <a:t>This course is a year long course spread over the two senior semesters. We were tasked with picking a project from a supplied list of clients and projects. For our projects we must communicate with our clients and create a design that fulfills the design requirements. As the project progresses and matures, meetings with the clients will continue to show progress and address concerns. The design will be revised to reflect the changes that the client requests. At the end of April the projects will be demonstrated and presented.</a:t>
             </a:r>
             <a:endParaRPr lang="en" dirty="0"/>
           </a:p>
@@ -951,7 +1557,7 @@
                 <a:ea typeface="+mn-ea"/>
                 <a:cs typeface="+mn-cs"/>
               </a:rPr>
-              <a:t> Bridge Competition in April. Our clients are John Diebold and Gordon Reynolds who are both Architecture professors at VTC. We were given a design budget of around $7000 to work with. We added an extra specification to our project that it should be open source so other schools can make their own based on our design.</a:t>
+              <a:t> Bridge Competition in April. Our clients are John Diebold and Gordon Reynolds who are both Architecture professors at VTC. We were given a maximum design budget of around $7000 to work with. We added an extra specification to our project that it should be open source so other schools can make their own based on our design.</a:t>
             </a:r>
             <a:endParaRPr dirty="0"/>
           </a:p>
@@ -1325,7 +1931,7 @@
                 <a:ea typeface="+mn-ea"/>
                 <a:cs typeface="+mn-cs"/>
               </a:rPr>
-              <a:t>Our preliminary design consists of a hydraulic cylinder fixed to the top of a truss frame design. The frame must fit a bridge with a span of a meter within it. The hydraulic cylinder has a stroke of 14” which should allow for plenty of reach. We are using a steel truss design over an I-Beam design in order to save overall weight while maintaining high structural strength and rigidity. A 7-Segment with 3” tall characters will be used to allow the audience to clearly see the current load value from a distance. A Raspberry Pi microcomputer will be used as the main controller for our project. It has the power of a standard computer with the low price and super small size of a microcontroller. An LCD screen with a custom GUI showing deformation in live time will be connected directly to the Raspberry Pi using an HDMI cable. A web interface will also be designed to allow for the downloading of run logs from remote locations.</a:t>
+              <a:t>Our preliminary design consists of a hydraulic cylinder fixed to the top of a truss frame design. The frame must fit a bridge with a span of a meter within it. The hydraulic cylinder has a stroke of 14” which should allow for plenty of reach. We are using a steel truss design over an I-Beam design in order to save overall weight while maintaining high structural strength and rigidity. A 7-Segment with 4” tall characters will be used to allow the audience to clearly see the current load value from a distance. A Raspberry Pi microcomputer will be used as the main controller for our project. It has the power of a standard computer with the low price and super small size of a microcontroller. An LCD screen with a custom GUI showing deformation in live time will be connected directly to the Raspberry Pi using an HDMI cable. A web interface will also be designed to allow for the downloading of run logs from remote locations.</a:t>
             </a:r>
             <a:endParaRPr lang="en-US" dirty="0"/>
           </a:p>
@@ -1556,10 +2162,10 @@
                 <a:ea typeface="+mn-ea"/>
                 <a:cs typeface="+mn-cs"/>
               </a:rPr>
-              <a:t>We were given a budget of around $7000. At this point in time we have done some general </a:t>
-            </a:r>
-            <a:r>
-              <a:rPr lang="en-US" sz="1200" b="0" i="0" u="none" strike="noStrike" kern="1200" dirty="0" err="1" smtClean="0">
+              <a:t>We were given a budget of around $7000. At this point in time we have done some the vast majority of the pricing and parts selected. Our current budget is just shy of $3400 with hydraulics taking up half of that amount and the</a:t>
+            </a:r>
+            <a:r>
+              <a:rPr lang="en-US" sz="1200" b="0" i="0" u="none" strike="noStrike" kern="1200" baseline="0" dirty="0" smtClean="0">
                 <a:solidFill>
                   <a:schemeClr val="tx1"/>
                 </a:solidFill>
@@ -1568,19 +2174,7 @@
                 <a:ea typeface="+mn-ea"/>
                 <a:cs typeface="+mn-cs"/>
               </a:rPr>
-              <a:t>speccing</a:t>
-            </a:r>
-            <a:r>
-              <a:rPr lang="en-US" sz="1200" b="0" i="0" u="none" strike="noStrike" kern="1200" dirty="0" smtClean="0">
-                <a:solidFill>
-                  <a:schemeClr val="tx1"/>
-                </a:solidFill>
-                <a:effectLst/>
-                <a:latin typeface="+mn-lt"/>
-                <a:ea typeface="+mn-ea"/>
-                <a:cs typeface="+mn-cs"/>
-              </a:rPr>
-              <a:t> and estimated some costs for unexpected and unspecified bits of hardware. At the moment our electronics total comes up to around $400, the hydraulics to about $1000, the mechanical to around $350, and the raw materials to around $500. This brings our total to just under $2300 which is significantly under budget. We are sure there will be unexpected costs to increase the total project costs but we will still come in quite a bit under budget.</a:t>
+              <a:t> remaining categories are all around 15-18% each.</a:t>
             </a:r>
             <a:endParaRPr dirty="0"/>
           </a:p>
@@ -1595,11 +2189,11 @@
 </file>
 
 <file path=ppt/notesSlides/notesSlide8.xml><?xml version="1.0" encoding="utf-8"?>
-<p:notes xmlns:a="http://schemas.openxmlformats.org/drawingml/2006/main" xmlns:r="http://schemas.openxmlformats.org/officeDocument/2006/relationships" xmlns:p="http://schemas.openxmlformats.org/presentationml/2006/main" showMasterSp="0" showMasterPhAnim="0">
+<p:notes xmlns:a="http://schemas.openxmlformats.org/drawingml/2006/main" xmlns:r="http://schemas.openxmlformats.org/officeDocument/2006/relationships" xmlns:p="http://schemas.openxmlformats.org/presentationml/2006/main">
   <p:cSld>
     <p:spTree>
       <p:nvGrpSpPr>
-        <p:cNvPr id="1" name="Shape 80"/>
+        <p:cNvPr id="1" name=""/>
         <p:cNvGrpSpPr/>
         <p:nvPr/>
       </p:nvGrpSpPr>
@@ -1613,123 +2207,80 @@
       </p:grpSpPr>
       <p:sp>
         <p:nvSpPr>
-          <p:cNvPr id="81" name="Shape 81"/>
+          <p:cNvPr id="2" name="Slide Image Placeholder 1"/>
           <p:cNvSpPr>
             <a:spLocks noGrp="1" noRot="1" noChangeAspect="1"/>
           </p:cNvSpPr>
           <p:nvPr>
-            <p:ph type="sldImg" idx="2"/>
+            <p:ph type="sldImg"/>
           </p:nvPr>
         </p:nvSpPr>
-        <p:spPr>
-          <a:xfrm>
-            <a:off x="1143000" y="685800"/>
-            <a:ext cx="4572000" cy="3429000"/>
-          </a:xfrm>
-          <a:custGeom>
-            <a:avLst/>
-            <a:gdLst/>
-            <a:ahLst/>
-            <a:cxnLst/>
-            <a:rect l="0" t="0" r="0" b="0"/>
-            <a:pathLst>
-              <a:path w="120000" h="120000" extrusionOk="0">
-                <a:moveTo>
-                  <a:pt x="0" y="0"/>
-                </a:moveTo>
-                <a:lnTo>
-                  <a:pt x="120000" y="0"/>
-                </a:lnTo>
-                <a:lnTo>
-                  <a:pt x="120000" y="120000"/>
-                </a:lnTo>
-                <a:lnTo>
-                  <a:pt x="0" y="120000"/>
-                </a:lnTo>
-                <a:close/>
-              </a:path>
-            </a:pathLst>
-          </a:custGeom>
-        </p:spPr>
+        <p:spPr/>
       </p:sp>
       <p:sp>
         <p:nvSpPr>
-          <p:cNvPr id="82" name="Shape 82"/>
-          <p:cNvSpPr txBox="1">
+          <p:cNvPr id="3" name="Notes Placeholder 2"/>
+          <p:cNvSpPr>
             <a:spLocks noGrp="1"/>
           </p:cNvSpPr>
           <p:nvPr>
             <p:ph type="body" idx="1"/>
           </p:nvPr>
         </p:nvSpPr>
-        <p:spPr>
-          <a:xfrm>
-            <a:off x="685800" y="4343400"/>
-            <a:ext cx="5486399" cy="4114800"/>
-          </a:xfrm>
-          <a:prstGeom prst="rect">
-            <a:avLst/>
-          </a:prstGeom>
-        </p:spPr>
+        <p:spPr/>
         <p:txBody>
-          <a:bodyPr lIns="91425" tIns="91425" rIns="91425" bIns="91425" anchor="t" anchorCtr="0">
-            <a:noAutofit/>
-          </a:bodyPr>
+          <a:bodyPr/>
           <a:lstStyle/>
           <a:p>
             <a:r>
-              <a:rPr lang="en-US" sz="1200" b="0" i="0" u="none" strike="noStrike" kern="1200" dirty="0" smtClean="0">
-                <a:solidFill>
-                  <a:schemeClr val="tx1"/>
-                </a:solidFill>
-                <a:effectLst/>
-                <a:latin typeface="+mn-lt"/>
-                <a:ea typeface="+mn-ea"/>
-                <a:cs typeface="+mn-cs"/>
-              </a:rPr>
-              <a:t>Our project fulfills all of the requirements for the class. It has the required amount of mechanical, electrical, and software specifications. Our design fulfills the specifications of Mr. </a:t>
-            </a:r>
-            <a:r>
-              <a:rPr lang="en-US" sz="1200" b="0" i="0" u="none" strike="noStrike" kern="1200" dirty="0" err="1" smtClean="0">
-                <a:solidFill>
-                  <a:schemeClr val="tx1"/>
-                </a:solidFill>
-                <a:effectLst/>
-                <a:latin typeface="+mn-lt"/>
-                <a:ea typeface="+mn-ea"/>
-                <a:cs typeface="+mn-cs"/>
-              </a:rPr>
-              <a:t>Diebolds</a:t>
-            </a:r>
-            <a:r>
-              <a:rPr lang="en-US" sz="1200" b="0" i="0" u="none" strike="noStrike" kern="1200" dirty="0" smtClean="0">
-                <a:solidFill>
-                  <a:schemeClr val="tx1"/>
-                </a:solidFill>
-                <a:effectLst/>
-                <a:latin typeface="+mn-lt"/>
-                <a:ea typeface="+mn-ea"/>
-                <a:cs typeface="+mn-cs"/>
-              </a:rPr>
-              <a:t> the client. </a:t>
-            </a:r>
-            <a:r>
-              <a:rPr lang="en-US" sz="1200" b="0" i="0" u="none" strike="noStrike" kern="1200" smtClean="0">
-                <a:solidFill>
-                  <a:schemeClr val="tx1"/>
-                </a:solidFill>
-                <a:effectLst/>
-                <a:latin typeface="+mn-lt"/>
-                <a:ea typeface="+mn-ea"/>
-                <a:cs typeface="+mn-cs"/>
-              </a:rPr>
-              <a:t>Our project will be able to be constructed in a timely fashion and will fall within our budget constraints.</a:t>
-            </a:r>
-            <a:endParaRPr/>
+              <a:rPr lang="en-US" dirty="0" smtClean="0"/>
+              <a:t>Here is our </a:t>
+            </a:r>
+            <a:r>
+              <a:rPr lang="en-US" dirty="0" err="1" smtClean="0"/>
+              <a:t>gaant</a:t>
+            </a:r>
+            <a:r>
+              <a:rPr lang="en-US" dirty="0" smtClean="0"/>
+              <a:t> chart with individual</a:t>
+            </a:r>
+            <a:r>
+              <a:rPr lang="en-US" baseline="0" dirty="0" smtClean="0"/>
+              <a:t> responsibilities and subsystems for each category. It shows due dates and what needs to be done in what order. It is available through our website via a link.</a:t>
+            </a:r>
+            <a:endParaRPr lang="en-US" dirty="0"/>
+          </a:p>
+        </p:txBody>
+      </p:sp>
+      <p:sp>
+        <p:nvSpPr>
+          <p:cNvPr id="4" name="Slide Number Placeholder 3"/>
+          <p:cNvSpPr>
+            <a:spLocks noGrp="1"/>
+          </p:cNvSpPr>
+          <p:nvPr>
+            <p:ph type="sldNum" sz="quarter" idx="10"/>
+          </p:nvPr>
+        </p:nvSpPr>
+        <p:spPr/>
+        <p:txBody>
+          <a:bodyPr/>
+          <a:lstStyle/>
+          <a:p>
+            <a:fld id="{61B1FFEF-BEF9-4EE0-94EC-51761DE7F5D7}" type="slidenum">
+              <a:rPr lang="en-US" smtClean="0"/>
+              <a:t>10</a:t>
+            </a:fld>
+            <a:endParaRPr lang="en-US"/>
           </a:p>
         </p:txBody>
       </p:sp>
     </p:spTree>
+    <p:extLst>
+      <p:ext uri="{BB962C8B-B14F-4D97-AF65-F5344CB8AC3E}">
+        <p14:creationId xmlns:p14="http://schemas.microsoft.com/office/powerpoint/2010/main" val="2836414543"/>
+      </p:ext>
+    </p:extLst>
   </p:cSld>
   <p:clrMapOvr>
     <a:masterClrMapping/>
@@ -1738,11 +2289,11 @@
 </file>
 
 <file path=ppt/notesSlides/notesSlide9.xml><?xml version="1.0" encoding="utf-8"?>
-<p:notes xmlns:a="http://schemas.openxmlformats.org/drawingml/2006/main" xmlns:r="http://schemas.openxmlformats.org/officeDocument/2006/relationships" xmlns:p="http://schemas.openxmlformats.org/presentationml/2006/main" showMasterSp="0" showMasterPhAnim="0">
+<p:notes xmlns:a="http://schemas.openxmlformats.org/drawingml/2006/main" xmlns:r="http://schemas.openxmlformats.org/officeDocument/2006/relationships" xmlns:p="http://schemas.openxmlformats.org/presentationml/2006/main">
   <p:cSld>
     <p:spTree>
       <p:nvGrpSpPr>
-        <p:cNvPr id="1" name="Shape 80"/>
+        <p:cNvPr id="1" name=""/>
         <p:cNvGrpSpPr/>
         <p:nvPr/>
       </p:nvGrpSpPr>
@@ -1756,75 +2307,80 @@
       </p:grpSpPr>
       <p:sp>
         <p:nvSpPr>
-          <p:cNvPr id="81" name="Shape 81"/>
+          <p:cNvPr id="2" name="Slide Image Placeholder 1"/>
           <p:cNvSpPr>
             <a:spLocks noGrp="1" noRot="1" noChangeAspect="1"/>
           </p:cNvSpPr>
           <p:nvPr>
-            <p:ph type="sldImg" idx="2"/>
+            <p:ph type="sldImg"/>
           </p:nvPr>
         </p:nvSpPr>
-        <p:spPr>
-          <a:xfrm>
-            <a:off x="1143000" y="685800"/>
-            <a:ext cx="4572000" cy="3429000"/>
-          </a:xfrm>
-          <a:custGeom>
-            <a:avLst/>
-            <a:gdLst/>
-            <a:ahLst/>
-            <a:cxnLst/>
-            <a:rect l="0" t="0" r="0" b="0"/>
-            <a:pathLst>
-              <a:path w="120000" h="120000" extrusionOk="0">
-                <a:moveTo>
-                  <a:pt x="0" y="0"/>
-                </a:moveTo>
-                <a:lnTo>
-                  <a:pt x="120000" y="0"/>
-                </a:lnTo>
-                <a:lnTo>
-                  <a:pt x="120000" y="120000"/>
-                </a:lnTo>
-                <a:lnTo>
-                  <a:pt x="0" y="120000"/>
-                </a:lnTo>
-                <a:close/>
-              </a:path>
-            </a:pathLst>
-          </a:custGeom>
-        </p:spPr>
+        <p:spPr/>
       </p:sp>
       <p:sp>
         <p:nvSpPr>
-          <p:cNvPr id="82" name="Shape 82"/>
-          <p:cNvSpPr txBox="1">
+          <p:cNvPr id="3" name="Notes Placeholder 2"/>
+          <p:cNvSpPr>
             <a:spLocks noGrp="1"/>
           </p:cNvSpPr>
           <p:nvPr>
             <p:ph type="body" idx="1"/>
           </p:nvPr>
         </p:nvSpPr>
-        <p:spPr>
-          <a:xfrm>
-            <a:off x="685800" y="4343400"/>
-            <a:ext cx="5486399" cy="4114800"/>
-          </a:xfrm>
-          <a:prstGeom prst="rect">
-            <a:avLst/>
-          </a:prstGeom>
-        </p:spPr>
+        <p:spPr/>
         <p:txBody>
-          <a:bodyPr lIns="91425" tIns="91425" rIns="91425" bIns="91425" anchor="t" anchorCtr="0">
-            <a:noAutofit/>
-          </a:bodyPr>
+          <a:bodyPr/>
           <a:lstStyle/>
           <a:p>
-            <a:endParaRPr/>
+            <a:r>
+              <a:rPr lang="en-US" dirty="0" smtClean="0"/>
+              <a:t>We currently</a:t>
+            </a:r>
+            <a:r>
+              <a:rPr lang="en-US" baseline="0" dirty="0" smtClean="0"/>
+              <a:t> have a website hosted on a private server here on campus. It showcases our project and has links to various subsections of our project like our </a:t>
+            </a:r>
+            <a:r>
+              <a:rPr lang="en-US" baseline="0" dirty="0" err="1" smtClean="0"/>
+              <a:t>gaant</a:t>
+            </a:r>
+            <a:r>
+              <a:rPr lang="en-US" baseline="0" dirty="0" smtClean="0"/>
+              <a:t> chart. It is currently unfinished and is a work in progress. As the semester continuous the website will be moved to the VTC servers to be preserved after graduation.</a:t>
+            </a:r>
+            <a:endParaRPr lang="en-US" dirty="0"/>
+          </a:p>
+        </p:txBody>
+      </p:sp>
+      <p:sp>
+        <p:nvSpPr>
+          <p:cNvPr id="4" name="Slide Number Placeholder 3"/>
+          <p:cNvSpPr>
+            <a:spLocks noGrp="1"/>
+          </p:cNvSpPr>
+          <p:nvPr>
+            <p:ph type="sldNum" sz="quarter" idx="10"/>
+          </p:nvPr>
+        </p:nvSpPr>
+        <p:spPr/>
+        <p:txBody>
+          <a:bodyPr/>
+          <a:lstStyle/>
+          <a:p>
+            <a:fld id="{61B1FFEF-BEF9-4EE0-94EC-51761DE7F5D7}" type="slidenum">
+              <a:rPr lang="en-US" smtClean="0"/>
+              <a:t>11</a:t>
+            </a:fld>
+            <a:endParaRPr lang="en-US"/>
           </a:p>
         </p:txBody>
       </p:sp>
     </p:spTree>
+    <p:extLst>
+      <p:ext uri="{BB962C8B-B14F-4D97-AF65-F5344CB8AC3E}">
+        <p14:creationId xmlns:p14="http://schemas.microsoft.com/office/powerpoint/2010/main" val="2249268791"/>
+      </p:ext>
+    </p:extLst>
   </p:cSld>
   <p:clrMapOvr>
     <a:masterClrMapping/>
@@ -2013,7 +2569,7 @@
           <a:p>
             <a:fld id="{CFC45A5F-7BC5-4F13-A9EC-CC4E0CE58B7F}" type="datetimeFigureOut">
               <a:rPr lang="en-US" smtClean="0"/>
-              <a:t>2/9/2014</a:t>
+              <a:t>2/10/2014</a:t>
             </a:fld>
             <a:endParaRPr lang="en-US"/>
           </a:p>
@@ -2183,7 +2739,7 @@
           <a:p>
             <a:fld id="{CFC45A5F-7BC5-4F13-A9EC-CC4E0CE58B7F}" type="datetimeFigureOut">
               <a:rPr lang="en-US" smtClean="0"/>
-              <a:t>2/9/2014</a:t>
+              <a:t>2/10/2014</a:t>
             </a:fld>
             <a:endParaRPr lang="en-US"/>
           </a:p>
@@ -2363,7 +2919,7 @@
           <a:p>
             <a:fld id="{CFC45A5F-7BC5-4F13-A9EC-CC4E0CE58B7F}" type="datetimeFigureOut">
               <a:rPr lang="en-US" smtClean="0"/>
-              <a:t>2/9/2014</a:t>
+              <a:t>2/10/2014</a:t>
             </a:fld>
             <a:endParaRPr lang="en-US"/>
           </a:p>
@@ -2673,7 +3229,7 @@
           <a:p>
             <a:fld id="{CFC45A5F-7BC5-4F13-A9EC-CC4E0CE58B7F}" type="datetimeFigureOut">
               <a:rPr lang="en-US" smtClean="0"/>
-              <a:t>2/9/2014</a:t>
+              <a:t>2/10/2014</a:t>
             </a:fld>
             <a:endParaRPr lang="en-US"/>
           </a:p>
@@ -2919,7 +3475,7 @@
           <a:p>
             <a:fld id="{CFC45A5F-7BC5-4F13-A9EC-CC4E0CE58B7F}" type="datetimeFigureOut">
               <a:rPr lang="en-US" smtClean="0"/>
-              <a:t>2/9/2014</a:t>
+              <a:t>2/10/2014</a:t>
             </a:fld>
             <a:endParaRPr lang="en-US"/>
           </a:p>
@@ -3207,7 +3763,7 @@
           <a:p>
             <a:fld id="{CFC45A5F-7BC5-4F13-A9EC-CC4E0CE58B7F}" type="datetimeFigureOut">
               <a:rPr lang="en-US" smtClean="0"/>
-              <a:t>2/9/2014</a:t>
+              <a:t>2/10/2014</a:t>
             </a:fld>
             <a:endParaRPr lang="en-US"/>
           </a:p>
@@ -3629,7 +4185,7 @@
           <a:p>
             <a:fld id="{CFC45A5F-7BC5-4F13-A9EC-CC4E0CE58B7F}" type="datetimeFigureOut">
               <a:rPr lang="en-US" smtClean="0"/>
-              <a:t>2/9/2014</a:t>
+              <a:t>2/10/2014</a:t>
             </a:fld>
             <a:endParaRPr lang="en-US"/>
           </a:p>
@@ -3747,7 +4303,7 @@
           <a:p>
             <a:fld id="{CFC45A5F-7BC5-4F13-A9EC-CC4E0CE58B7F}" type="datetimeFigureOut">
               <a:rPr lang="en-US" smtClean="0"/>
-              <a:t>2/9/2014</a:t>
+              <a:t>2/10/2014</a:t>
             </a:fld>
             <a:endParaRPr lang="en-US"/>
           </a:p>
@@ -3842,7 +4398,7 @@
           <a:p>
             <a:fld id="{CFC45A5F-7BC5-4F13-A9EC-CC4E0CE58B7F}" type="datetimeFigureOut">
               <a:rPr lang="en-US" smtClean="0"/>
-              <a:t>2/9/2014</a:t>
+              <a:t>2/10/2014</a:t>
             </a:fld>
             <a:endParaRPr lang="en-US"/>
           </a:p>
@@ -4119,7 +4675,7 @@
           <a:p>
             <a:fld id="{CFC45A5F-7BC5-4F13-A9EC-CC4E0CE58B7F}" type="datetimeFigureOut">
               <a:rPr lang="en-US" smtClean="0"/>
-              <a:t>2/9/2014</a:t>
+              <a:t>2/10/2014</a:t>
             </a:fld>
             <a:endParaRPr lang="en-US"/>
           </a:p>
@@ -4372,7 +4928,7 @@
           <a:p>
             <a:fld id="{CFC45A5F-7BC5-4F13-A9EC-CC4E0CE58B7F}" type="datetimeFigureOut">
               <a:rPr lang="en-US" smtClean="0"/>
-              <a:t>2/9/2014</a:t>
+              <a:t>2/10/2014</a:t>
             </a:fld>
             <a:endParaRPr lang="en-US"/>
           </a:p>
@@ -4585,7 +5141,7 @@
           <a:p>
             <a:fld id="{CFC45A5F-7BC5-4F13-A9EC-CC4E0CE58B7F}" type="datetimeFigureOut">
               <a:rPr lang="en-US" smtClean="0"/>
-              <a:t>2/9/2014</a:t>
+              <a:t>2/10/2014</a:t>
             </a:fld>
             <a:endParaRPr lang="en-US"/>
           </a:p>
@@ -5127,7 +5683,7 @@
           <p:nvPr/>
         </p:nvPicPr>
         <p:blipFill rotWithShape="1">
-          <a:blip r:embed="rId2">
+          <a:blip r:embed="rId3">
             <a:extLst>
               <a:ext uri="{28A0092B-C50C-407E-A947-70E740481C1C}">
                 <a14:useLocalDpi xmlns:a14="http://schemas.microsoft.com/office/drawing/2010/main" val="0"/>
@@ -5404,7 +5960,7 @@
           <p:nvPr/>
         </p:nvPicPr>
         <p:blipFill rotWithShape="1">
-          <a:blip r:embed="rId2">
+          <a:blip r:embed="rId3">
             <a:extLst>
               <a:ext uri="{28A0092B-C50C-407E-A947-70E740481C1C}">
                 <a14:useLocalDpi xmlns:a14="http://schemas.microsoft.com/office/drawing/2010/main" val="0"/>
@@ -5468,266 +6024,6 @@
 </file>
 
 <file path=ppt/slides/slide12.xml><?xml version="1.0" encoding="utf-8"?>
-<p:sld xmlns:a="http://schemas.openxmlformats.org/drawingml/2006/main" xmlns:r="http://schemas.openxmlformats.org/officeDocument/2006/relationships" xmlns:p="http://schemas.openxmlformats.org/presentationml/2006/main">
-  <p:cSld>
-    <p:spTree>
-      <p:nvGrpSpPr>
-        <p:cNvPr id="1" name=""/>
-        <p:cNvGrpSpPr/>
-        <p:nvPr/>
-      </p:nvGrpSpPr>
-      <p:grpSpPr>
-        <a:xfrm>
-          <a:off x="0" y="0"/>
-          <a:ext cx="0" cy="0"/>
-          <a:chOff x="0" y="0"/>
-          <a:chExt cx="0" cy="0"/>
-        </a:xfrm>
-      </p:grpSpPr>
-      <p:pic>
-        <p:nvPicPr>
-          <p:cNvPr id="2051" name="Picture 3"/>
-          <p:cNvPicPr>
-            <a:picLocks noChangeAspect="1" noChangeArrowheads="1"/>
-          </p:cNvPicPr>
-          <p:nvPr/>
-        </p:nvPicPr>
-        <p:blipFill rotWithShape="1">
-          <a:blip r:embed="rId2">
-            <a:extLst>
-              <a:ext uri="{BEBA8EAE-BF5A-486C-A8C5-ECC9F3942E4B}">
-                <a14:imgProps xmlns:a14="http://schemas.microsoft.com/office/drawing/2010/main">
-                  <a14:imgLayer r:embed="rId3">
-                    <a14:imgEffect>
-                      <a14:backgroundRemoval t="5629" b="92871" l="9857" r="89905">
-                        <a14:backgroundMark x1="60689" y1="70169" x2="60689" y2="70169"/>
-                      </a14:backgroundRemoval>
-                    </a14:imgEffect>
-                  </a14:imgLayer>
-                </a14:imgProps>
-              </a:ext>
-              <a:ext uri="{28A0092B-C50C-407E-A947-70E740481C1C}">
-                <a14:useLocalDpi xmlns:a14="http://schemas.microsoft.com/office/drawing/2010/main" val="0"/>
-              </a:ext>
-            </a:extLst>
-          </a:blip>
-          <a:srcRect l="34799" t="7616" r="33712" b="6330"/>
-          <a:stretch/>
-        </p:blipFill>
-        <p:spPr bwMode="auto">
-          <a:xfrm flipH="1">
-            <a:off x="4495800" y="0"/>
-            <a:ext cx="4038600" cy="6722679"/>
-          </a:xfrm>
-          <a:prstGeom prst="rect">
-            <a:avLst/>
-          </a:prstGeom>
-          <a:noFill/>
-          <a:ln>
-            <a:noFill/>
-          </a:ln>
-          <a:extLst>
-            <a:ext uri="{909E8E84-426E-40DD-AFC4-6F175D3DCCD1}">
-              <a14:hiddenFill xmlns:a14="http://schemas.microsoft.com/office/drawing/2010/main">
-                <a:solidFill>
-                  <a:schemeClr val="accent1"/>
-                </a:solidFill>
-              </a14:hiddenFill>
-            </a:ext>
-            <a:ext uri="{91240B29-F687-4F45-9708-019B960494DF}">
-              <a14:hiddenLine xmlns:a14="http://schemas.microsoft.com/office/drawing/2010/main" w="9525">
-                <a:solidFill>
-                  <a:schemeClr val="tx1"/>
-                </a:solidFill>
-                <a:miter lim="800000"/>
-                <a:headEnd/>
-                <a:tailEnd/>
-              </a14:hiddenLine>
-            </a:ext>
-          </a:extLst>
-        </p:spPr>
-      </p:pic>
-      <p:sp>
-        <p:nvSpPr>
-          <p:cNvPr id="2" name="Title 1"/>
-          <p:cNvSpPr>
-            <a:spLocks noGrp="1"/>
-          </p:cNvSpPr>
-          <p:nvPr>
-            <p:ph type="title"/>
-          </p:nvPr>
-        </p:nvSpPr>
-        <p:spPr>
-          <a:xfrm>
-            <a:off x="457200" y="152400"/>
-            <a:ext cx="8229600" cy="1143000"/>
-          </a:xfrm>
-        </p:spPr>
-        <p:txBody>
-          <a:bodyPr/>
-          <a:lstStyle/>
-          <a:p>
-            <a:r>
-              <a:rPr lang="en-US" dirty="0" smtClean="0"/>
-              <a:t>The Frame</a:t>
-            </a:r>
-            <a:endParaRPr lang="en-US" dirty="0"/>
-          </a:p>
-        </p:txBody>
-      </p:sp>
-      <p:pic>
-        <p:nvPicPr>
-          <p:cNvPr id="2050" name="Picture 2"/>
-          <p:cNvPicPr>
-            <a:picLocks noChangeAspect="1" noChangeArrowheads="1"/>
-          </p:cNvPicPr>
-          <p:nvPr/>
-        </p:nvPicPr>
-        <p:blipFill rotWithShape="1">
-          <a:blip r:embed="rId4">
-            <a:extLst>
-              <a:ext uri="{BEBA8EAE-BF5A-486C-A8C5-ECC9F3942E4B}">
-                <a14:imgProps xmlns:a14="http://schemas.microsoft.com/office/drawing/2010/main">
-                  <a14:imgLayer r:embed="rId5">
-                    <a14:imgEffect>
-                      <a14:backgroundRemoval t="7431" b="94161" l="35124" r="87911"/>
-                    </a14:imgEffect>
-                  </a14:imgLayer>
-                </a14:imgProps>
-              </a:ext>
-              <a:ext uri="{28A0092B-C50C-407E-A947-70E740481C1C}">
-                <a14:useLocalDpi xmlns:a14="http://schemas.microsoft.com/office/drawing/2010/main" val="0"/>
-              </a:ext>
-            </a:extLst>
-          </a:blip>
-          <a:srcRect l="34897" t="7602" r="34001" b="3751"/>
-          <a:stretch/>
-        </p:blipFill>
-        <p:spPr bwMode="auto">
-          <a:xfrm>
-            <a:off x="228600" y="457200"/>
-            <a:ext cx="3352800" cy="6045437"/>
-          </a:xfrm>
-          <a:prstGeom prst="rect">
-            <a:avLst/>
-          </a:prstGeom>
-          <a:noFill/>
-          <a:ln>
-            <a:noFill/>
-          </a:ln>
-          <a:extLst>
-            <a:ext uri="{909E8E84-426E-40DD-AFC4-6F175D3DCCD1}">
-              <a14:hiddenFill xmlns:a14="http://schemas.microsoft.com/office/drawing/2010/main">
-                <a:solidFill>
-                  <a:schemeClr val="accent1"/>
-                </a:solidFill>
-              </a14:hiddenFill>
-            </a:ext>
-            <a:ext uri="{91240B29-F687-4F45-9708-019B960494DF}">
-              <a14:hiddenLine xmlns:a14="http://schemas.microsoft.com/office/drawing/2010/main" w="9525">
-                <a:solidFill>
-                  <a:schemeClr val="tx1"/>
-                </a:solidFill>
-                <a:miter lim="800000"/>
-                <a:headEnd/>
-                <a:tailEnd/>
-              </a14:hiddenLine>
-            </a:ext>
-          </a:extLst>
-        </p:spPr>
-      </p:pic>
-      <p:sp>
-        <p:nvSpPr>
-          <p:cNvPr id="4" name="TextBox 3"/>
-          <p:cNvSpPr txBox="1"/>
-          <p:nvPr/>
-        </p:nvSpPr>
-        <p:spPr>
-          <a:xfrm>
-            <a:off x="800100" y="914400"/>
-            <a:ext cx="2209800" cy="1754326"/>
-          </a:xfrm>
-          <a:prstGeom prst="rect">
-            <a:avLst/>
-          </a:prstGeom>
-          <a:noFill/>
-        </p:spPr>
-        <p:txBody>
-          <a:bodyPr wrap="square" rtlCol="0">
-            <a:spAutoFit/>
-          </a:bodyPr>
-          <a:lstStyle/>
-          <a:p>
-            <a:r>
-              <a:rPr lang="en-US" sz="3600" dirty="0" smtClean="0"/>
-              <a:t>Minimum Safety Factor is 2</a:t>
-            </a:r>
-            <a:endParaRPr lang="en-US" sz="3600" dirty="0"/>
-          </a:p>
-        </p:txBody>
-      </p:sp>
-      <p:sp>
-        <p:nvSpPr>
-          <p:cNvPr id="7" name="TextBox 6"/>
-          <p:cNvSpPr txBox="1"/>
-          <p:nvPr/>
-        </p:nvSpPr>
-        <p:spPr>
-          <a:xfrm>
-            <a:off x="5410200" y="928914"/>
-            <a:ext cx="2667000" cy="2308324"/>
-          </a:xfrm>
-          <a:prstGeom prst="rect">
-            <a:avLst/>
-          </a:prstGeom>
-          <a:noFill/>
-        </p:spPr>
-        <p:txBody>
-          <a:bodyPr wrap="square" rtlCol="0">
-            <a:spAutoFit/>
-          </a:bodyPr>
-          <a:lstStyle/>
-          <a:p>
-            <a:r>
-              <a:rPr lang="en-US" sz="3600" dirty="0" smtClean="0"/>
-              <a:t>Truss Is lighter and stiffer than </a:t>
-            </a:r>
-            <a:r>
-              <a:rPr lang="en-US" sz="3600" dirty="0" smtClean="0">
-                <a:latin typeface="Times New Roman" panose="02020603050405020304" pitchFamily="18" charset="0"/>
-                <a:cs typeface="Times New Roman" panose="02020603050405020304" pitchFamily="18" charset="0"/>
-              </a:rPr>
-              <a:t>I</a:t>
-            </a:r>
-            <a:r>
-              <a:rPr lang="en-US" sz="3600" dirty="0" smtClean="0"/>
-              <a:t> beam</a:t>
-            </a:r>
-            <a:endParaRPr lang="en-US" sz="3600" dirty="0"/>
-          </a:p>
-        </p:txBody>
-      </p:sp>
-    </p:spTree>
-    <p:extLst>
-      <p:ext uri="{BB962C8B-B14F-4D97-AF65-F5344CB8AC3E}">
-        <p14:creationId xmlns:p14="http://schemas.microsoft.com/office/powerpoint/2010/main" val="174033532"/>
-      </p:ext>
-    </p:extLst>
-  </p:cSld>
-  <p:clrMapOvr>
-    <a:masterClrMapping/>
-  </p:clrMapOvr>
-  <p:timing>
-    <p:tnLst>
-      <p:par>
-        <p:cTn id="1" dur="indefinite" restart="never" nodeType="tmRoot"/>
-      </p:par>
-    </p:tnLst>
-  </p:timing>
-</p:sld>
-</file>
-
-<file path=ppt/slides/slide13.xml><?xml version="1.0" encoding="utf-8"?>
 <p:sld xmlns:a="http://schemas.openxmlformats.org/drawingml/2006/main" xmlns:r="http://schemas.openxmlformats.org/officeDocument/2006/relationships" xmlns:p="http://schemas.openxmlformats.org/presentationml/2006/main">
   <p:cSld>
     <p:spTree>
@@ -8549,6 +8845,266 @@
 </p:sld>
 </file>
 
+<file path=ppt/slides/slide13.xml><?xml version="1.0" encoding="utf-8"?>
+<p:sld xmlns:a="http://schemas.openxmlformats.org/drawingml/2006/main" xmlns:r="http://schemas.openxmlformats.org/officeDocument/2006/relationships" xmlns:p="http://schemas.openxmlformats.org/presentationml/2006/main">
+  <p:cSld>
+    <p:spTree>
+      <p:nvGrpSpPr>
+        <p:cNvPr id="1" name=""/>
+        <p:cNvGrpSpPr/>
+        <p:nvPr/>
+      </p:nvGrpSpPr>
+      <p:grpSpPr>
+        <a:xfrm>
+          <a:off x="0" y="0"/>
+          <a:ext cx="0" cy="0"/>
+          <a:chOff x="0" y="0"/>
+          <a:chExt cx="0" cy="0"/>
+        </a:xfrm>
+      </p:grpSpPr>
+      <p:pic>
+        <p:nvPicPr>
+          <p:cNvPr id="2051" name="Picture 3"/>
+          <p:cNvPicPr>
+            <a:picLocks noChangeAspect="1" noChangeArrowheads="1"/>
+          </p:cNvPicPr>
+          <p:nvPr/>
+        </p:nvPicPr>
+        <p:blipFill rotWithShape="1">
+          <a:blip r:embed="rId3">
+            <a:extLst>
+              <a:ext uri="{BEBA8EAE-BF5A-486C-A8C5-ECC9F3942E4B}">
+                <a14:imgProps xmlns:a14="http://schemas.microsoft.com/office/drawing/2010/main">
+                  <a14:imgLayer r:embed="rId4">
+                    <a14:imgEffect>
+                      <a14:backgroundRemoval t="5629" b="92871" l="9857" r="89905">
+                        <a14:backgroundMark x1="60689" y1="70169" x2="60689" y2="70169"/>
+                      </a14:backgroundRemoval>
+                    </a14:imgEffect>
+                  </a14:imgLayer>
+                </a14:imgProps>
+              </a:ext>
+              <a:ext uri="{28A0092B-C50C-407E-A947-70E740481C1C}">
+                <a14:useLocalDpi xmlns:a14="http://schemas.microsoft.com/office/drawing/2010/main" val="0"/>
+              </a:ext>
+            </a:extLst>
+          </a:blip>
+          <a:srcRect l="34799" t="7616" r="33712" b="6330"/>
+          <a:stretch/>
+        </p:blipFill>
+        <p:spPr bwMode="auto">
+          <a:xfrm flipH="1">
+            <a:off x="4495800" y="0"/>
+            <a:ext cx="4038600" cy="6722679"/>
+          </a:xfrm>
+          <a:prstGeom prst="rect">
+            <a:avLst/>
+          </a:prstGeom>
+          <a:noFill/>
+          <a:ln>
+            <a:noFill/>
+          </a:ln>
+          <a:extLst>
+            <a:ext uri="{909E8E84-426E-40DD-AFC4-6F175D3DCCD1}">
+              <a14:hiddenFill xmlns:a14="http://schemas.microsoft.com/office/drawing/2010/main">
+                <a:solidFill>
+                  <a:schemeClr val="accent1"/>
+                </a:solidFill>
+              </a14:hiddenFill>
+            </a:ext>
+            <a:ext uri="{91240B29-F687-4F45-9708-019B960494DF}">
+              <a14:hiddenLine xmlns:a14="http://schemas.microsoft.com/office/drawing/2010/main" w="9525">
+                <a:solidFill>
+                  <a:schemeClr val="tx1"/>
+                </a:solidFill>
+                <a:miter lim="800000"/>
+                <a:headEnd/>
+                <a:tailEnd/>
+              </a14:hiddenLine>
+            </a:ext>
+          </a:extLst>
+        </p:spPr>
+      </p:pic>
+      <p:sp>
+        <p:nvSpPr>
+          <p:cNvPr id="2" name="Title 1"/>
+          <p:cNvSpPr>
+            <a:spLocks noGrp="1"/>
+          </p:cNvSpPr>
+          <p:nvPr>
+            <p:ph type="title"/>
+          </p:nvPr>
+        </p:nvSpPr>
+        <p:spPr>
+          <a:xfrm>
+            <a:off x="457200" y="152400"/>
+            <a:ext cx="8229600" cy="1143000"/>
+          </a:xfrm>
+        </p:spPr>
+        <p:txBody>
+          <a:bodyPr/>
+          <a:lstStyle/>
+          <a:p>
+            <a:r>
+              <a:rPr lang="en-US" dirty="0" smtClean="0"/>
+              <a:t>The Frame</a:t>
+            </a:r>
+            <a:endParaRPr lang="en-US" dirty="0"/>
+          </a:p>
+        </p:txBody>
+      </p:sp>
+      <p:pic>
+        <p:nvPicPr>
+          <p:cNvPr id="2050" name="Picture 2"/>
+          <p:cNvPicPr>
+            <a:picLocks noChangeAspect="1" noChangeArrowheads="1"/>
+          </p:cNvPicPr>
+          <p:nvPr/>
+        </p:nvPicPr>
+        <p:blipFill rotWithShape="1">
+          <a:blip r:embed="rId5">
+            <a:extLst>
+              <a:ext uri="{BEBA8EAE-BF5A-486C-A8C5-ECC9F3942E4B}">
+                <a14:imgProps xmlns:a14="http://schemas.microsoft.com/office/drawing/2010/main">
+                  <a14:imgLayer r:embed="rId6">
+                    <a14:imgEffect>
+                      <a14:backgroundRemoval t="7431" b="94161" l="35124" r="87911"/>
+                    </a14:imgEffect>
+                  </a14:imgLayer>
+                </a14:imgProps>
+              </a:ext>
+              <a:ext uri="{28A0092B-C50C-407E-A947-70E740481C1C}">
+                <a14:useLocalDpi xmlns:a14="http://schemas.microsoft.com/office/drawing/2010/main" val="0"/>
+              </a:ext>
+            </a:extLst>
+          </a:blip>
+          <a:srcRect l="34897" t="7602" r="34001" b="3751"/>
+          <a:stretch/>
+        </p:blipFill>
+        <p:spPr bwMode="auto">
+          <a:xfrm>
+            <a:off x="228600" y="457200"/>
+            <a:ext cx="3352800" cy="6045437"/>
+          </a:xfrm>
+          <a:prstGeom prst="rect">
+            <a:avLst/>
+          </a:prstGeom>
+          <a:noFill/>
+          <a:ln>
+            <a:noFill/>
+          </a:ln>
+          <a:extLst>
+            <a:ext uri="{909E8E84-426E-40DD-AFC4-6F175D3DCCD1}">
+              <a14:hiddenFill xmlns:a14="http://schemas.microsoft.com/office/drawing/2010/main">
+                <a:solidFill>
+                  <a:schemeClr val="accent1"/>
+                </a:solidFill>
+              </a14:hiddenFill>
+            </a:ext>
+            <a:ext uri="{91240B29-F687-4F45-9708-019B960494DF}">
+              <a14:hiddenLine xmlns:a14="http://schemas.microsoft.com/office/drawing/2010/main" w="9525">
+                <a:solidFill>
+                  <a:schemeClr val="tx1"/>
+                </a:solidFill>
+                <a:miter lim="800000"/>
+                <a:headEnd/>
+                <a:tailEnd/>
+              </a14:hiddenLine>
+            </a:ext>
+          </a:extLst>
+        </p:spPr>
+      </p:pic>
+      <p:sp>
+        <p:nvSpPr>
+          <p:cNvPr id="4" name="TextBox 3"/>
+          <p:cNvSpPr txBox="1"/>
+          <p:nvPr/>
+        </p:nvSpPr>
+        <p:spPr>
+          <a:xfrm>
+            <a:off x="800100" y="914400"/>
+            <a:ext cx="2209800" cy="1754326"/>
+          </a:xfrm>
+          <a:prstGeom prst="rect">
+            <a:avLst/>
+          </a:prstGeom>
+          <a:noFill/>
+        </p:spPr>
+        <p:txBody>
+          <a:bodyPr wrap="square" rtlCol="0">
+            <a:spAutoFit/>
+          </a:bodyPr>
+          <a:lstStyle/>
+          <a:p>
+            <a:r>
+              <a:rPr lang="en-US" sz="3600" dirty="0" smtClean="0"/>
+              <a:t>Minimum Safety Factor is 2</a:t>
+            </a:r>
+            <a:endParaRPr lang="en-US" sz="3600" dirty="0"/>
+          </a:p>
+        </p:txBody>
+      </p:sp>
+      <p:sp>
+        <p:nvSpPr>
+          <p:cNvPr id="7" name="TextBox 6"/>
+          <p:cNvSpPr txBox="1"/>
+          <p:nvPr/>
+        </p:nvSpPr>
+        <p:spPr>
+          <a:xfrm>
+            <a:off x="5410200" y="928914"/>
+            <a:ext cx="2667000" cy="2308324"/>
+          </a:xfrm>
+          <a:prstGeom prst="rect">
+            <a:avLst/>
+          </a:prstGeom>
+          <a:noFill/>
+        </p:spPr>
+        <p:txBody>
+          <a:bodyPr wrap="square" rtlCol="0">
+            <a:spAutoFit/>
+          </a:bodyPr>
+          <a:lstStyle/>
+          <a:p>
+            <a:r>
+              <a:rPr lang="en-US" sz="3600" dirty="0" smtClean="0"/>
+              <a:t>Truss Is lighter and stiffer than </a:t>
+            </a:r>
+            <a:r>
+              <a:rPr lang="en-US" sz="3600" dirty="0" smtClean="0">
+                <a:latin typeface="Times New Roman" panose="02020603050405020304" pitchFamily="18" charset="0"/>
+                <a:cs typeface="Times New Roman" panose="02020603050405020304" pitchFamily="18" charset="0"/>
+              </a:rPr>
+              <a:t>I</a:t>
+            </a:r>
+            <a:r>
+              <a:rPr lang="en-US" sz="3600" dirty="0" smtClean="0"/>
+              <a:t> beam</a:t>
+            </a:r>
+            <a:endParaRPr lang="en-US" sz="3600" dirty="0"/>
+          </a:p>
+        </p:txBody>
+      </p:sp>
+    </p:spTree>
+    <p:extLst>
+      <p:ext uri="{BB962C8B-B14F-4D97-AF65-F5344CB8AC3E}">
+        <p14:creationId xmlns:p14="http://schemas.microsoft.com/office/powerpoint/2010/main" val="174033532"/>
+      </p:ext>
+    </p:extLst>
+  </p:cSld>
+  <p:clrMapOvr>
+    <a:masterClrMapping/>
+  </p:clrMapOvr>
+  <p:timing>
+    <p:tnLst>
+      <p:par>
+        <p:cTn id="1" dur="indefinite" restart="never" nodeType="tmRoot"/>
+      </p:par>
+    </p:tnLst>
+  </p:timing>
+</p:sld>
+</file>
+
 <file path=ppt/slides/slide14.xml><?xml version="1.0" encoding="utf-8"?>
 <p:sld xmlns:a="http://schemas.openxmlformats.org/drawingml/2006/main" xmlns:r="http://schemas.openxmlformats.org/officeDocument/2006/relationships" xmlns:p="http://schemas.openxmlformats.org/presentationml/2006/main">
   <p:cSld>
@@ -8583,7 +9139,7 @@
           <p:nvPr/>
         </p:nvPicPr>
         <p:blipFill rotWithShape="1">
-          <a:blip r:embed="rId2">
+          <a:blip r:embed="rId3">
             <a:extLst>
               <a:ext uri="{28A0092B-C50C-407E-A947-70E740481C1C}">
                 <a14:useLocalDpi xmlns:a14="http://schemas.microsoft.com/office/drawing/2010/main" val="0"/>
@@ -9565,7 +10121,7 @@
               <a:buNone/>
             </a:pPr>
             <a:r>
-              <a:rPr lang="en"/>
+              <a:rPr lang="en" dirty="0"/>
               <a:t>Project Background</a:t>
             </a:r>
           </a:p>
@@ -9706,7 +10262,7 @@
           <p:nvPr>
             <p:extLst>
               <p:ext uri="{D42A27DB-BD31-4B8C-83A1-F6EECF244321}">
-                <p14:modId xmlns:p14="http://schemas.microsoft.com/office/powerpoint/2010/main" val="3635790530"/>
+                <p14:modId xmlns:p14="http://schemas.microsoft.com/office/powerpoint/2010/main" val="4099004032"/>
               </p:ext>
             </p:extLst>
           </p:nvPr>
@@ -9735,9 +10291,10 @@
                         <a:buNone/>
                       </a:pPr>
                       <a:r>
-                        <a:rPr lang="en" sz="2400" dirty="0"/>
-                        <a:t>Budget</a:t>
-                      </a:r>
+                        <a:rPr lang="en" sz="2400" dirty="0" smtClean="0"/>
+                        <a:t>Maximum Budget</a:t>
+                      </a:r>
+                      <a:endParaRPr lang="en" sz="2400" dirty="0"/>
                     </a:p>
                   </a:txBody>
                   <a:tcPr marL="91425" marR="91425" marT="121900" marB="121900"/>
@@ -13039,3166 +13596,6 @@
         <a:graphic>
           <a:graphicData uri="http://schemas.openxmlformats.org/drawingml/2006/chart">
             <c:chart xmlns:c="http://schemas.openxmlformats.org/drawingml/2006/chart" xmlns:r="http://schemas.openxmlformats.org/officeDocument/2006/relationships" r:id="rId3"/>
-          </a:graphicData>
-        </a:graphic>
-      </p:graphicFrame>
-      <p:graphicFrame>
-        <p:nvGraphicFramePr>
-          <p:cNvPr id="2" name="Table 1"/>
-          <p:cNvGraphicFramePr>
-            <a:graphicFrameLocks noGrp="1"/>
-          </p:cNvGraphicFramePr>
-          <p:nvPr>
-            <p:extLst>
-              <p:ext uri="{D42A27DB-BD31-4B8C-83A1-F6EECF244321}">
-                <p14:modId xmlns:p14="http://schemas.microsoft.com/office/powerpoint/2010/main" val="2029486563"/>
-              </p:ext>
-            </p:extLst>
-          </p:nvPr>
-        </p:nvGraphicFramePr>
-        <p:xfrm>
-          <a:off x="76200" y="7010400"/>
-          <a:ext cx="5105400" cy="4933656"/>
-        </p:xfrm>
-        <a:graphic>
-          <a:graphicData uri="http://schemas.openxmlformats.org/drawingml/2006/table">
-            <a:tbl>
-              <a:tblPr>
-                <a:tableStyleId>{5C22544A-7EE6-4342-B048-85BDC9FD1C3A}</a:tableStyleId>
-              </a:tblPr>
-              <a:tblGrid>
-                <a:gridCol w="1519751"/>
-                <a:gridCol w="669246"/>
-                <a:gridCol w="669246"/>
-                <a:gridCol w="669246"/>
-                <a:gridCol w="669246"/>
-                <a:gridCol w="908665"/>
-              </a:tblGrid>
-              <a:tr h="104617">
-                <a:tc>
-                  <a:txBody>
-                    <a:bodyPr/>
-                    <a:lstStyle/>
-                    <a:p>
-                      <a:pPr algn="l" fontAlgn="b"/>
-                      <a:r>
-                        <a:rPr lang="en-US" sz="1100" b="0" i="0" u="none" strike="noStrike">
-                          <a:solidFill>
-                            <a:srgbClr val="000000"/>
-                          </a:solidFill>
-                          <a:effectLst/>
-                          <a:latin typeface="Calibri"/>
-                        </a:rPr>
-                        <a:t>Name</a:t>
-                      </a:r>
-                    </a:p>
-                  </a:txBody>
-                  <a:tcPr marL="9525" marR="9525" marT="9525" marB="0" anchor="b"/>
-                </a:tc>
-                <a:tc>
-                  <a:txBody>
-                    <a:bodyPr/>
-                    <a:lstStyle/>
-                    <a:p>
-                      <a:pPr algn="l" fontAlgn="b"/>
-                      <a:r>
-                        <a:rPr lang="en-US" sz="1100" b="0" i="0" u="none" strike="noStrike">
-                          <a:solidFill>
-                            <a:srgbClr val="000000"/>
-                          </a:solidFill>
-                          <a:effectLst/>
-                          <a:latin typeface="Calibri"/>
-                        </a:rPr>
-                        <a:t>Qt</a:t>
-                      </a:r>
-                    </a:p>
-                  </a:txBody>
-                  <a:tcPr marL="9525" marR="9525" marT="9525" marB="0" anchor="b"/>
-                </a:tc>
-                <a:tc>
-                  <a:txBody>
-                    <a:bodyPr/>
-                    <a:lstStyle/>
-                    <a:p>
-                      <a:pPr algn="l" fontAlgn="b"/>
-                      <a:r>
-                        <a:rPr lang="en-US" sz="1100" b="0" i="0" u="none" strike="noStrike">
-                          <a:solidFill>
-                            <a:srgbClr val="000000"/>
-                          </a:solidFill>
-                          <a:effectLst/>
-                          <a:latin typeface="Calibri"/>
-                        </a:rPr>
-                        <a:t> Price  </a:t>
-                      </a:r>
-                    </a:p>
-                  </a:txBody>
-                  <a:tcPr marL="9525" marR="9525" marT="9525" marB="0" anchor="b"/>
-                </a:tc>
-                <a:tc>
-                  <a:txBody>
-                    <a:bodyPr/>
-                    <a:lstStyle/>
-                    <a:p>
-                      <a:pPr algn="l" fontAlgn="b"/>
-                      <a:r>
-                        <a:rPr lang="en-US" sz="1100" b="0" i="0" u="none" strike="noStrike">
-                          <a:solidFill>
-                            <a:srgbClr val="000000"/>
-                          </a:solidFill>
-                          <a:effectLst/>
-                          <a:latin typeface="Calibri"/>
-                        </a:rPr>
-                        <a:t> Shipping </a:t>
-                      </a:r>
-                    </a:p>
-                  </a:txBody>
-                  <a:tcPr marL="9525" marR="9525" marT="9525" marB="0" anchor="b"/>
-                </a:tc>
-                <a:tc>
-                  <a:txBody>
-                    <a:bodyPr/>
-                    <a:lstStyle/>
-                    <a:p>
-                      <a:pPr algn="l" fontAlgn="b"/>
-                      <a:r>
-                        <a:rPr lang="en-US" sz="1100" b="0" i="0" u="none" strike="noStrike">
-                          <a:solidFill>
-                            <a:srgbClr val="000000"/>
-                          </a:solidFill>
-                          <a:effectLst/>
-                          <a:latin typeface="Calibri"/>
-                        </a:rPr>
-                        <a:t> Total </a:t>
-                      </a:r>
-                    </a:p>
-                  </a:txBody>
-                  <a:tcPr marL="9525" marR="9525" marT="9525" marB="0" anchor="b"/>
-                </a:tc>
-                <a:tc>
-                  <a:txBody>
-                    <a:bodyPr/>
-                    <a:lstStyle/>
-                    <a:p>
-                      <a:pPr algn="l" fontAlgn="b"/>
-                      <a:endParaRPr lang="en-US" sz="1100" b="0" i="0" u="none" strike="noStrike">
-                        <a:solidFill>
-                          <a:srgbClr val="000000"/>
-                        </a:solidFill>
-                        <a:effectLst/>
-                        <a:latin typeface="Calibri"/>
-                      </a:endParaRPr>
-                    </a:p>
-                  </a:txBody>
-                  <a:tcPr marL="9525" marR="9525" marT="9525" marB="0" anchor="b"/>
-                </a:tc>
-              </a:tr>
-              <a:tr h="104617">
-                <a:tc gridSpan="5">
-                  <a:txBody>
-                    <a:bodyPr/>
-                    <a:lstStyle/>
-                    <a:p>
-                      <a:pPr algn="ctr" fontAlgn="b"/>
-                      <a:r>
-                        <a:rPr lang="en-US" sz="1100" b="1" i="0" u="none" strike="noStrike">
-                          <a:solidFill>
-                            <a:srgbClr val="000000"/>
-                          </a:solidFill>
-                          <a:effectLst/>
-                          <a:latin typeface="Calibri"/>
-                        </a:rPr>
-                        <a:t>Electronics</a:t>
-                      </a:r>
-                    </a:p>
-                  </a:txBody>
-                  <a:tcPr marL="9525" marR="9525" marT="9525" marB="0" anchor="b"/>
-                </a:tc>
-                <a:tc hMerge="1">
-                  <a:txBody>
-                    <a:bodyPr/>
-                    <a:lstStyle/>
-                    <a:p>
-                      <a:endParaRPr lang="en-US"/>
-                    </a:p>
-                  </a:txBody>
-                  <a:tcPr/>
-                </a:tc>
-                <a:tc hMerge="1">
-                  <a:txBody>
-                    <a:bodyPr/>
-                    <a:lstStyle/>
-                    <a:p>
-                      <a:endParaRPr lang="en-US"/>
-                    </a:p>
-                  </a:txBody>
-                  <a:tcPr/>
-                </a:tc>
-                <a:tc hMerge="1">
-                  <a:txBody>
-                    <a:bodyPr/>
-                    <a:lstStyle/>
-                    <a:p>
-                      <a:endParaRPr lang="en-US"/>
-                    </a:p>
-                  </a:txBody>
-                  <a:tcPr/>
-                </a:tc>
-                <a:tc hMerge="1">
-                  <a:txBody>
-                    <a:bodyPr/>
-                    <a:lstStyle/>
-                    <a:p>
-                      <a:endParaRPr lang="en-US"/>
-                    </a:p>
-                  </a:txBody>
-                  <a:tcPr/>
-                </a:tc>
-                <a:tc>
-                  <a:txBody>
-                    <a:bodyPr/>
-                    <a:lstStyle/>
-                    <a:p>
-                      <a:pPr algn="l" fontAlgn="b"/>
-                      <a:r>
-                        <a:rPr lang="en-US" sz="1100" b="1" i="0" u="none" strike="noStrike">
-                          <a:solidFill>
-                            <a:srgbClr val="000000"/>
-                          </a:solidFill>
-                          <a:effectLst/>
-                          <a:latin typeface="Calibri"/>
-                        </a:rPr>
-                        <a:t> $     600.95 </a:t>
-                      </a:r>
-                    </a:p>
-                  </a:txBody>
-                  <a:tcPr marL="9525" marR="9525" marT="9525" marB="0" anchor="b"/>
-                </a:tc>
-              </a:tr>
-              <a:tr h="131149">
-                <a:tc>
-                  <a:txBody>
-                    <a:bodyPr/>
-                    <a:lstStyle/>
-                    <a:p>
-                      <a:pPr algn="l" fontAlgn="b"/>
-                      <a:r>
-                        <a:rPr lang="en-US" sz="1100" b="0" i="0" u="none" strike="noStrike">
-                          <a:solidFill>
-                            <a:srgbClr val="000000"/>
-                          </a:solidFill>
-                          <a:effectLst/>
-                          <a:latin typeface="Calibri"/>
-                        </a:rPr>
-                        <a:t>7 segment display</a:t>
-                      </a:r>
-                    </a:p>
-                  </a:txBody>
-                  <a:tcPr marL="9525" marR="9525" marT="9525" marB="0" anchor="b"/>
-                </a:tc>
-                <a:tc>
-                  <a:txBody>
-                    <a:bodyPr/>
-                    <a:lstStyle/>
-                    <a:p>
-                      <a:pPr algn="r" fontAlgn="b"/>
-                      <a:r>
-                        <a:rPr lang="en-US" sz="1100" b="0" i="0" u="none" strike="noStrike">
-                          <a:solidFill>
-                            <a:srgbClr val="000000"/>
-                          </a:solidFill>
-                          <a:effectLst/>
-                          <a:latin typeface="Calibri"/>
-                        </a:rPr>
-                        <a:t>5</a:t>
-                      </a:r>
-                    </a:p>
-                  </a:txBody>
-                  <a:tcPr marL="9525" marR="9525" marT="9525" marB="0" anchor="b"/>
-                </a:tc>
-                <a:tc>
-                  <a:txBody>
-                    <a:bodyPr/>
-                    <a:lstStyle/>
-                    <a:p>
-                      <a:pPr algn="l" fontAlgn="b"/>
-                      <a:r>
-                        <a:rPr lang="en-US" sz="1100" b="0" i="0" u="none" strike="noStrike">
-                          <a:solidFill>
-                            <a:srgbClr val="000000"/>
-                          </a:solidFill>
-                          <a:effectLst/>
-                          <a:latin typeface="Calibri"/>
-                        </a:rPr>
-                        <a:t> $    16.46 </a:t>
-                      </a:r>
-                    </a:p>
-                  </a:txBody>
-                  <a:tcPr marL="9525" marR="9525" marT="9525" marB="0" anchor="b"/>
-                </a:tc>
-                <a:tc>
-                  <a:txBody>
-                    <a:bodyPr/>
-                    <a:lstStyle/>
-                    <a:p>
-                      <a:pPr algn="l" fontAlgn="b"/>
-                      <a:r>
-                        <a:rPr lang="en-US" sz="1100" b="0" i="0" u="none" strike="noStrike">
-                          <a:solidFill>
-                            <a:srgbClr val="000000"/>
-                          </a:solidFill>
-                          <a:effectLst/>
-                          <a:latin typeface="Calibri"/>
-                        </a:rPr>
-                        <a:t> $    15.00 </a:t>
-                      </a:r>
-                    </a:p>
-                  </a:txBody>
-                  <a:tcPr marL="9525" marR="9525" marT="9525" marB="0" anchor="b"/>
-                </a:tc>
-                <a:tc>
-                  <a:txBody>
-                    <a:bodyPr/>
-                    <a:lstStyle/>
-                    <a:p>
-                      <a:pPr algn="l" fontAlgn="b"/>
-                      <a:r>
-                        <a:rPr lang="en-US" sz="1100" b="0" i="0" u="none" strike="noStrike">
-                          <a:solidFill>
-                            <a:srgbClr val="000000"/>
-                          </a:solidFill>
-                          <a:effectLst/>
-                          <a:latin typeface="Calibri"/>
-                        </a:rPr>
-                        <a:t> $    97.30 </a:t>
-                      </a:r>
-                    </a:p>
-                  </a:txBody>
-                  <a:tcPr marL="9525" marR="9525" marT="9525" marB="0" anchor="b"/>
-                </a:tc>
-                <a:tc>
-                  <a:txBody>
-                    <a:bodyPr/>
-                    <a:lstStyle/>
-                    <a:p>
-                      <a:pPr algn="l" fontAlgn="b"/>
-                      <a:endParaRPr lang="en-US" sz="1100" b="0" i="0" u="none" strike="noStrike">
-                        <a:solidFill>
-                          <a:srgbClr val="000000"/>
-                        </a:solidFill>
-                        <a:effectLst/>
-                        <a:latin typeface="Calibri"/>
-                      </a:endParaRPr>
-                    </a:p>
-                  </a:txBody>
-                  <a:tcPr marL="9525" marR="9525" marT="9525" marB="0" anchor="b"/>
-                </a:tc>
-              </a:tr>
-              <a:tr h="104617">
-                <a:tc>
-                  <a:txBody>
-                    <a:bodyPr/>
-                    <a:lstStyle/>
-                    <a:p>
-                      <a:pPr algn="l" fontAlgn="b"/>
-                      <a:r>
-                        <a:rPr lang="en-US" sz="1100" b="0" i="0" u="none" strike="noStrike">
-                          <a:solidFill>
-                            <a:srgbClr val="000000"/>
-                          </a:solidFill>
-                          <a:effectLst/>
-                          <a:latin typeface="Calibri"/>
-                        </a:rPr>
-                        <a:t>Rasberry Pi</a:t>
-                      </a:r>
-                    </a:p>
-                  </a:txBody>
-                  <a:tcPr marL="9525" marR="9525" marT="9525" marB="0" anchor="b"/>
-                </a:tc>
-                <a:tc>
-                  <a:txBody>
-                    <a:bodyPr/>
-                    <a:lstStyle/>
-                    <a:p>
-                      <a:pPr algn="r" fontAlgn="b"/>
-                      <a:r>
-                        <a:rPr lang="en-US" sz="1100" b="0" i="0" u="none" strike="noStrike">
-                          <a:solidFill>
-                            <a:srgbClr val="000000"/>
-                          </a:solidFill>
-                          <a:effectLst/>
-                          <a:latin typeface="Calibri"/>
-                        </a:rPr>
-                        <a:t>1</a:t>
-                      </a:r>
-                    </a:p>
-                  </a:txBody>
-                  <a:tcPr marL="9525" marR="9525" marT="9525" marB="0" anchor="b"/>
-                </a:tc>
-                <a:tc>
-                  <a:txBody>
-                    <a:bodyPr/>
-                    <a:lstStyle/>
-                    <a:p>
-                      <a:pPr algn="l" fontAlgn="b"/>
-                      <a:r>
-                        <a:rPr lang="en-US" sz="1100" b="0" i="0" u="none" strike="noStrike">
-                          <a:solidFill>
-                            <a:srgbClr val="000000"/>
-                          </a:solidFill>
-                          <a:effectLst/>
-                          <a:latin typeface="Calibri"/>
-                        </a:rPr>
-                        <a:t> $    55.00 </a:t>
-                      </a:r>
-                    </a:p>
-                  </a:txBody>
-                  <a:tcPr marL="9525" marR="9525" marT="9525" marB="0" anchor="b"/>
-                </a:tc>
-                <a:tc>
-                  <a:txBody>
-                    <a:bodyPr/>
-                    <a:lstStyle/>
-                    <a:p>
-                      <a:pPr algn="l" fontAlgn="b"/>
-                      <a:r>
-                        <a:rPr lang="en-US" sz="1100" b="0" i="0" u="none" strike="noStrike">
-                          <a:solidFill>
-                            <a:srgbClr val="000000"/>
-                          </a:solidFill>
-                          <a:effectLst/>
-                          <a:latin typeface="Calibri"/>
-                        </a:rPr>
-                        <a:t> $    12.72 </a:t>
-                      </a:r>
-                    </a:p>
-                  </a:txBody>
-                  <a:tcPr marL="9525" marR="9525" marT="9525" marB="0" anchor="b"/>
-                </a:tc>
-                <a:tc>
-                  <a:txBody>
-                    <a:bodyPr/>
-                    <a:lstStyle/>
-                    <a:p>
-                      <a:pPr algn="l" fontAlgn="b"/>
-                      <a:r>
-                        <a:rPr lang="en-US" sz="1100" b="0" i="0" u="none" strike="noStrike">
-                          <a:solidFill>
-                            <a:srgbClr val="000000"/>
-                          </a:solidFill>
-                          <a:effectLst/>
-                          <a:latin typeface="Calibri"/>
-                        </a:rPr>
-                        <a:t> $    67.72 </a:t>
-                      </a:r>
-                    </a:p>
-                  </a:txBody>
-                  <a:tcPr marL="9525" marR="9525" marT="9525" marB="0" anchor="b"/>
-                </a:tc>
-                <a:tc>
-                  <a:txBody>
-                    <a:bodyPr/>
-                    <a:lstStyle/>
-                    <a:p>
-                      <a:pPr algn="l" fontAlgn="b"/>
-                      <a:endParaRPr lang="en-US" sz="1100" b="0" i="0" u="none" strike="noStrike">
-                        <a:solidFill>
-                          <a:srgbClr val="000000"/>
-                        </a:solidFill>
-                        <a:effectLst/>
-                        <a:latin typeface="Calibri"/>
-                      </a:endParaRPr>
-                    </a:p>
-                  </a:txBody>
-                  <a:tcPr marL="9525" marR="9525" marT="9525" marB="0" anchor="b"/>
-                </a:tc>
-              </a:tr>
-              <a:tr h="104617">
-                <a:tc>
-                  <a:txBody>
-                    <a:bodyPr/>
-                    <a:lstStyle/>
-                    <a:p>
-                      <a:pPr algn="l" fontAlgn="b"/>
-                      <a:r>
-                        <a:rPr lang="en-US" sz="1100" b="0" i="0" u="none" strike="noStrike">
-                          <a:solidFill>
-                            <a:srgbClr val="000000"/>
-                          </a:solidFill>
-                          <a:effectLst/>
-                          <a:latin typeface="Calibri"/>
-                        </a:rPr>
-                        <a:t>Monitor</a:t>
-                      </a:r>
-                    </a:p>
-                  </a:txBody>
-                  <a:tcPr marL="9525" marR="9525" marT="9525" marB="0" anchor="b"/>
-                </a:tc>
-                <a:tc>
-                  <a:txBody>
-                    <a:bodyPr/>
-                    <a:lstStyle/>
-                    <a:p>
-                      <a:pPr algn="r" fontAlgn="b"/>
-                      <a:r>
-                        <a:rPr lang="en-US" sz="1100" b="0" i="0" u="none" strike="noStrike">
-                          <a:solidFill>
-                            <a:srgbClr val="000000"/>
-                          </a:solidFill>
-                          <a:effectLst/>
-                          <a:latin typeface="Calibri"/>
-                        </a:rPr>
-                        <a:t>1</a:t>
-                      </a:r>
-                    </a:p>
-                  </a:txBody>
-                  <a:tcPr marL="9525" marR="9525" marT="9525" marB="0" anchor="b"/>
-                </a:tc>
-                <a:tc>
-                  <a:txBody>
-                    <a:bodyPr/>
-                    <a:lstStyle/>
-                    <a:p>
-                      <a:pPr algn="l" fontAlgn="b"/>
-                      <a:r>
-                        <a:rPr lang="en-US" sz="1100" b="0" i="0" u="none" strike="noStrike">
-                          <a:solidFill>
-                            <a:srgbClr val="000000"/>
-                          </a:solidFill>
-                          <a:effectLst/>
-                          <a:latin typeface="Calibri"/>
-                        </a:rPr>
-                        <a:t> $  136.00 </a:t>
-                      </a:r>
-                    </a:p>
-                  </a:txBody>
-                  <a:tcPr marL="9525" marR="9525" marT="9525" marB="0" anchor="b"/>
-                </a:tc>
-                <a:tc>
-                  <a:txBody>
-                    <a:bodyPr/>
-                    <a:lstStyle/>
-                    <a:p>
-                      <a:pPr algn="l" fontAlgn="b"/>
-                      <a:r>
-                        <a:rPr lang="en-US" sz="1100" b="0" i="0" u="none" strike="noStrike">
-                          <a:solidFill>
-                            <a:srgbClr val="000000"/>
-                          </a:solidFill>
-                          <a:effectLst/>
-                          <a:latin typeface="Calibri"/>
-                        </a:rPr>
-                        <a:t> $           -   </a:t>
-                      </a:r>
-                    </a:p>
-                  </a:txBody>
-                  <a:tcPr marL="9525" marR="9525" marT="9525" marB="0" anchor="b"/>
-                </a:tc>
-                <a:tc>
-                  <a:txBody>
-                    <a:bodyPr/>
-                    <a:lstStyle/>
-                    <a:p>
-                      <a:pPr algn="l" fontAlgn="b"/>
-                      <a:r>
-                        <a:rPr lang="en-US" sz="1100" b="0" i="0" u="none" strike="noStrike">
-                          <a:solidFill>
-                            <a:srgbClr val="000000"/>
-                          </a:solidFill>
-                          <a:effectLst/>
-                          <a:latin typeface="Calibri"/>
-                        </a:rPr>
-                        <a:t> $  136.00 </a:t>
-                      </a:r>
-                    </a:p>
-                  </a:txBody>
-                  <a:tcPr marL="9525" marR="9525" marT="9525" marB="0" anchor="b"/>
-                </a:tc>
-                <a:tc>
-                  <a:txBody>
-                    <a:bodyPr/>
-                    <a:lstStyle/>
-                    <a:p>
-                      <a:pPr algn="l" fontAlgn="b"/>
-                      <a:endParaRPr lang="en-US" sz="1100" b="0" i="0" u="none" strike="noStrike">
-                        <a:solidFill>
-                          <a:srgbClr val="000000"/>
-                        </a:solidFill>
-                        <a:effectLst/>
-                        <a:latin typeface="Calibri"/>
-                      </a:endParaRPr>
-                    </a:p>
-                  </a:txBody>
-                  <a:tcPr marL="9525" marR="9525" marT="9525" marB="0" anchor="b"/>
-                </a:tc>
-              </a:tr>
-              <a:tr h="104617">
-                <a:tc>
-                  <a:txBody>
-                    <a:bodyPr/>
-                    <a:lstStyle/>
-                    <a:p>
-                      <a:pPr algn="l" fontAlgn="b"/>
-                      <a:r>
-                        <a:rPr lang="en-US" sz="1100" b="0" i="0" u="none" strike="noStrike">
-                          <a:solidFill>
-                            <a:srgbClr val="000000"/>
-                          </a:solidFill>
-                          <a:effectLst/>
-                          <a:latin typeface="Calibri"/>
-                        </a:rPr>
-                        <a:t>hdmi cord</a:t>
-                      </a:r>
-                    </a:p>
-                  </a:txBody>
-                  <a:tcPr marL="9525" marR="9525" marT="9525" marB="0" anchor="b"/>
-                </a:tc>
-                <a:tc>
-                  <a:txBody>
-                    <a:bodyPr/>
-                    <a:lstStyle/>
-                    <a:p>
-                      <a:pPr algn="r" fontAlgn="b"/>
-                      <a:r>
-                        <a:rPr lang="en-US" sz="1100" b="0" i="0" u="none" strike="noStrike">
-                          <a:solidFill>
-                            <a:srgbClr val="000000"/>
-                          </a:solidFill>
-                          <a:effectLst/>
-                          <a:latin typeface="Calibri"/>
-                        </a:rPr>
-                        <a:t>1</a:t>
-                      </a:r>
-                    </a:p>
-                  </a:txBody>
-                  <a:tcPr marL="9525" marR="9525" marT="9525" marB="0" anchor="b"/>
-                </a:tc>
-                <a:tc>
-                  <a:txBody>
-                    <a:bodyPr/>
-                    <a:lstStyle/>
-                    <a:p>
-                      <a:pPr algn="l" fontAlgn="b"/>
-                      <a:r>
-                        <a:rPr lang="en-US" sz="1100" b="0" i="0" u="none" strike="noStrike">
-                          <a:solidFill>
-                            <a:srgbClr val="000000"/>
-                          </a:solidFill>
-                          <a:effectLst/>
-                          <a:latin typeface="Calibri"/>
-                        </a:rPr>
-                        <a:t> $       5.79 </a:t>
-                      </a:r>
-                    </a:p>
-                  </a:txBody>
-                  <a:tcPr marL="9525" marR="9525" marT="9525" marB="0" anchor="b"/>
-                </a:tc>
-                <a:tc>
-                  <a:txBody>
-                    <a:bodyPr/>
-                    <a:lstStyle/>
-                    <a:p>
-                      <a:pPr algn="l" fontAlgn="b"/>
-                      <a:r>
-                        <a:rPr lang="en-US" sz="1100" b="0" i="0" u="none" strike="noStrike">
-                          <a:solidFill>
-                            <a:srgbClr val="000000"/>
-                          </a:solidFill>
-                          <a:effectLst/>
-                          <a:latin typeface="Calibri"/>
-                        </a:rPr>
-                        <a:t> $           -   </a:t>
-                      </a:r>
-                    </a:p>
-                  </a:txBody>
-                  <a:tcPr marL="9525" marR="9525" marT="9525" marB="0" anchor="b"/>
-                </a:tc>
-                <a:tc>
-                  <a:txBody>
-                    <a:bodyPr/>
-                    <a:lstStyle/>
-                    <a:p>
-                      <a:pPr algn="l" fontAlgn="b"/>
-                      <a:r>
-                        <a:rPr lang="en-US" sz="1100" b="0" i="0" u="none" strike="noStrike">
-                          <a:solidFill>
-                            <a:srgbClr val="000000"/>
-                          </a:solidFill>
-                          <a:effectLst/>
-                          <a:latin typeface="Calibri"/>
-                        </a:rPr>
-                        <a:t> $       5.79 </a:t>
-                      </a:r>
-                    </a:p>
-                  </a:txBody>
-                  <a:tcPr marL="9525" marR="9525" marT="9525" marB="0" anchor="b"/>
-                </a:tc>
-                <a:tc>
-                  <a:txBody>
-                    <a:bodyPr/>
-                    <a:lstStyle/>
-                    <a:p>
-                      <a:pPr algn="l" fontAlgn="b"/>
-                      <a:endParaRPr lang="en-US" sz="1100" b="0" i="0" u="none" strike="noStrike">
-                        <a:solidFill>
-                          <a:srgbClr val="000000"/>
-                        </a:solidFill>
-                        <a:effectLst/>
-                        <a:latin typeface="Calibri"/>
-                      </a:endParaRPr>
-                    </a:p>
-                  </a:txBody>
-                  <a:tcPr marL="9525" marR="9525" marT="9525" marB="0" anchor="b"/>
-                </a:tc>
-              </a:tr>
-              <a:tr h="104617">
-                <a:tc>
-                  <a:txBody>
-                    <a:bodyPr/>
-                    <a:lstStyle/>
-                    <a:p>
-                      <a:pPr algn="l" fontAlgn="b"/>
-                      <a:r>
-                        <a:rPr lang="en-US" sz="1100" b="0" i="0" u="none" strike="noStrike">
-                          <a:solidFill>
-                            <a:srgbClr val="000000"/>
-                          </a:solidFill>
-                          <a:effectLst/>
-                          <a:latin typeface="Calibri"/>
-                        </a:rPr>
-                        <a:t>i2c ADC</a:t>
-                      </a:r>
-                    </a:p>
-                  </a:txBody>
-                  <a:tcPr marL="9525" marR="9525" marT="9525" marB="0" anchor="b"/>
-                </a:tc>
-                <a:tc>
-                  <a:txBody>
-                    <a:bodyPr/>
-                    <a:lstStyle/>
-                    <a:p>
-                      <a:pPr algn="r" fontAlgn="b"/>
-                      <a:r>
-                        <a:rPr lang="en-US" sz="1100" b="0" i="0" u="none" strike="noStrike">
-                          <a:solidFill>
-                            <a:srgbClr val="000000"/>
-                          </a:solidFill>
-                          <a:effectLst/>
-                          <a:latin typeface="Calibri"/>
-                        </a:rPr>
-                        <a:t>1</a:t>
-                      </a:r>
-                    </a:p>
-                  </a:txBody>
-                  <a:tcPr marL="9525" marR="9525" marT="9525" marB="0" anchor="b"/>
-                </a:tc>
-                <a:tc>
-                  <a:txBody>
-                    <a:bodyPr/>
-                    <a:lstStyle/>
-                    <a:p>
-                      <a:pPr algn="l" fontAlgn="b"/>
-                      <a:r>
-                        <a:rPr lang="en-US" sz="1100" b="0" i="0" u="none" strike="noStrike">
-                          <a:solidFill>
-                            <a:srgbClr val="000000"/>
-                          </a:solidFill>
-                          <a:effectLst/>
-                          <a:latin typeface="Calibri"/>
-                        </a:rPr>
-                        <a:t> $    14.95 </a:t>
-                      </a:r>
-                    </a:p>
-                  </a:txBody>
-                  <a:tcPr marL="9525" marR="9525" marT="9525" marB="0" anchor="b"/>
-                </a:tc>
-                <a:tc>
-                  <a:txBody>
-                    <a:bodyPr/>
-                    <a:lstStyle/>
-                    <a:p>
-                      <a:pPr algn="l" fontAlgn="b"/>
-                      <a:r>
-                        <a:rPr lang="en-US" sz="1100" b="0" i="0" u="none" strike="noStrike">
-                          <a:solidFill>
-                            <a:srgbClr val="000000"/>
-                          </a:solidFill>
-                          <a:effectLst/>
-                          <a:latin typeface="Calibri"/>
-                        </a:rPr>
-                        <a:t> $       4.07 </a:t>
-                      </a:r>
-                    </a:p>
-                  </a:txBody>
-                  <a:tcPr marL="9525" marR="9525" marT="9525" marB="0" anchor="b"/>
-                </a:tc>
-                <a:tc>
-                  <a:txBody>
-                    <a:bodyPr/>
-                    <a:lstStyle/>
-                    <a:p>
-                      <a:pPr algn="l" fontAlgn="b"/>
-                      <a:r>
-                        <a:rPr lang="en-US" sz="1100" b="0" i="0" u="none" strike="noStrike">
-                          <a:solidFill>
-                            <a:srgbClr val="000000"/>
-                          </a:solidFill>
-                          <a:effectLst/>
-                          <a:latin typeface="Calibri"/>
-                        </a:rPr>
-                        <a:t> $    19.02 </a:t>
-                      </a:r>
-                    </a:p>
-                  </a:txBody>
-                  <a:tcPr marL="9525" marR="9525" marT="9525" marB="0" anchor="b"/>
-                </a:tc>
-                <a:tc>
-                  <a:txBody>
-                    <a:bodyPr/>
-                    <a:lstStyle/>
-                    <a:p>
-                      <a:pPr algn="l" fontAlgn="b"/>
-                      <a:endParaRPr lang="en-US" sz="1100" b="0" i="0" u="none" strike="noStrike">
-                        <a:solidFill>
-                          <a:srgbClr val="000000"/>
-                        </a:solidFill>
-                        <a:effectLst/>
-                        <a:latin typeface="Calibri"/>
-                      </a:endParaRPr>
-                    </a:p>
-                  </a:txBody>
-                  <a:tcPr marL="9525" marR="9525" marT="9525" marB="0" anchor="b"/>
-                </a:tc>
-              </a:tr>
-              <a:tr h="104617">
-                <a:tc>
-                  <a:txBody>
-                    <a:bodyPr/>
-                    <a:lstStyle/>
-                    <a:p>
-                      <a:pPr algn="l" fontAlgn="b"/>
-                      <a:r>
-                        <a:rPr lang="en-US" sz="1100" b="0" i="0" u="none" strike="noStrike">
-                          <a:solidFill>
-                            <a:srgbClr val="000000"/>
-                          </a:solidFill>
-                          <a:effectLst/>
-                          <a:latin typeface="Calibri"/>
-                        </a:rPr>
-                        <a:t>Switches</a:t>
-                      </a:r>
-                    </a:p>
-                  </a:txBody>
-                  <a:tcPr marL="9525" marR="9525" marT="9525" marB="0" anchor="b"/>
-                </a:tc>
-                <a:tc>
-                  <a:txBody>
-                    <a:bodyPr/>
-                    <a:lstStyle/>
-                    <a:p>
-                      <a:pPr algn="r" fontAlgn="b"/>
-                      <a:r>
-                        <a:rPr lang="en-US" sz="1100" b="0" i="0" u="none" strike="noStrike">
-                          <a:solidFill>
-                            <a:srgbClr val="000000"/>
-                          </a:solidFill>
-                          <a:effectLst/>
-                          <a:latin typeface="Calibri"/>
-                        </a:rPr>
-                        <a:t>1</a:t>
-                      </a:r>
-                    </a:p>
-                  </a:txBody>
-                  <a:tcPr marL="9525" marR="9525" marT="9525" marB="0" anchor="b"/>
-                </a:tc>
-                <a:tc>
-                  <a:txBody>
-                    <a:bodyPr/>
-                    <a:lstStyle/>
-                    <a:p>
-                      <a:pPr algn="l" fontAlgn="b"/>
-                      <a:r>
-                        <a:rPr lang="en-US" sz="1100" b="0" i="0" u="none" strike="noStrike">
-                          <a:solidFill>
-                            <a:srgbClr val="000000"/>
-                          </a:solidFill>
-                          <a:effectLst/>
-                          <a:latin typeface="Calibri"/>
-                        </a:rPr>
-                        <a:t> $       5.95 </a:t>
-                      </a:r>
-                    </a:p>
-                  </a:txBody>
-                  <a:tcPr marL="9525" marR="9525" marT="9525" marB="0" anchor="b"/>
-                </a:tc>
-                <a:tc>
-                  <a:txBody>
-                    <a:bodyPr/>
-                    <a:lstStyle/>
-                    <a:p>
-                      <a:pPr algn="l" fontAlgn="b"/>
-                      <a:r>
-                        <a:rPr lang="en-US" sz="1100" b="0" i="0" u="none" strike="noStrike">
-                          <a:solidFill>
-                            <a:srgbClr val="000000"/>
-                          </a:solidFill>
-                          <a:effectLst/>
-                          <a:latin typeface="Calibri"/>
-                        </a:rPr>
-                        <a:t> $           -   </a:t>
-                      </a:r>
-                    </a:p>
-                  </a:txBody>
-                  <a:tcPr marL="9525" marR="9525" marT="9525" marB="0" anchor="b"/>
-                </a:tc>
-                <a:tc>
-                  <a:txBody>
-                    <a:bodyPr/>
-                    <a:lstStyle/>
-                    <a:p>
-                      <a:pPr algn="l" fontAlgn="b"/>
-                      <a:r>
-                        <a:rPr lang="en-US" sz="1100" b="0" i="0" u="none" strike="noStrike">
-                          <a:solidFill>
-                            <a:srgbClr val="000000"/>
-                          </a:solidFill>
-                          <a:effectLst/>
-                          <a:latin typeface="Calibri"/>
-                        </a:rPr>
-                        <a:t> $       5.95 </a:t>
-                      </a:r>
-                    </a:p>
-                  </a:txBody>
-                  <a:tcPr marL="9525" marR="9525" marT="9525" marB="0" anchor="b"/>
-                </a:tc>
-                <a:tc>
-                  <a:txBody>
-                    <a:bodyPr/>
-                    <a:lstStyle/>
-                    <a:p>
-                      <a:pPr algn="l" fontAlgn="b"/>
-                      <a:endParaRPr lang="en-US" sz="1100" b="0" i="0" u="none" strike="noStrike">
-                        <a:solidFill>
-                          <a:srgbClr val="000000"/>
-                        </a:solidFill>
-                        <a:effectLst/>
-                        <a:latin typeface="Calibri"/>
-                      </a:endParaRPr>
-                    </a:p>
-                  </a:txBody>
-                  <a:tcPr marL="9525" marR="9525" marT="9525" marB="0" anchor="b"/>
-                </a:tc>
-              </a:tr>
-              <a:tr h="104617">
-                <a:tc>
-                  <a:txBody>
-                    <a:bodyPr/>
-                    <a:lstStyle/>
-                    <a:p>
-                      <a:pPr algn="l" fontAlgn="b"/>
-                      <a:r>
-                        <a:rPr lang="en-US" sz="1100" b="0" i="0" u="none" strike="noStrike">
-                          <a:solidFill>
-                            <a:srgbClr val="000000"/>
-                          </a:solidFill>
-                          <a:effectLst/>
-                          <a:latin typeface="Calibri"/>
-                        </a:rPr>
-                        <a:t>Misc </a:t>
-                      </a:r>
-                    </a:p>
-                  </a:txBody>
-                  <a:tcPr marL="9525" marR="9525" marT="9525" marB="0" anchor="b"/>
-                </a:tc>
-                <a:tc>
-                  <a:txBody>
-                    <a:bodyPr/>
-                    <a:lstStyle/>
-                    <a:p>
-                      <a:pPr algn="r" fontAlgn="b"/>
-                      <a:r>
-                        <a:rPr lang="en-US" sz="1100" b="0" i="0" u="none" strike="noStrike">
-                          <a:solidFill>
-                            <a:srgbClr val="000000"/>
-                          </a:solidFill>
-                          <a:effectLst/>
-                          <a:latin typeface="Calibri"/>
-                        </a:rPr>
-                        <a:t>1</a:t>
-                      </a:r>
-                    </a:p>
-                  </a:txBody>
-                  <a:tcPr marL="9525" marR="9525" marT="9525" marB="0" anchor="b"/>
-                </a:tc>
-                <a:tc>
-                  <a:txBody>
-                    <a:bodyPr/>
-                    <a:lstStyle/>
-                    <a:p>
-                      <a:pPr algn="l" fontAlgn="b"/>
-                      <a:r>
-                        <a:rPr lang="en-US" sz="1100" b="0" i="0" u="none" strike="noStrike">
-                          <a:solidFill>
-                            <a:srgbClr val="000000"/>
-                          </a:solidFill>
-                          <a:effectLst/>
-                          <a:latin typeface="Calibri"/>
-                        </a:rPr>
-                        <a:t> $  150.00 </a:t>
-                      </a:r>
-                    </a:p>
-                  </a:txBody>
-                  <a:tcPr marL="9525" marR="9525" marT="9525" marB="0" anchor="b"/>
-                </a:tc>
-                <a:tc>
-                  <a:txBody>
-                    <a:bodyPr/>
-                    <a:lstStyle/>
-                    <a:p>
-                      <a:pPr algn="l" fontAlgn="b"/>
-                      <a:r>
-                        <a:rPr lang="en-US" sz="1100" b="0" i="0" u="none" strike="noStrike">
-                          <a:solidFill>
-                            <a:srgbClr val="000000"/>
-                          </a:solidFill>
-                          <a:effectLst/>
-                          <a:latin typeface="Calibri"/>
-                        </a:rPr>
-                        <a:t> $           -   </a:t>
-                      </a:r>
-                    </a:p>
-                  </a:txBody>
-                  <a:tcPr marL="9525" marR="9525" marT="9525" marB="0" anchor="b"/>
-                </a:tc>
-                <a:tc>
-                  <a:txBody>
-                    <a:bodyPr/>
-                    <a:lstStyle/>
-                    <a:p>
-                      <a:pPr algn="l" fontAlgn="b"/>
-                      <a:r>
-                        <a:rPr lang="en-US" sz="1100" b="0" i="0" u="none" strike="noStrike">
-                          <a:solidFill>
-                            <a:srgbClr val="000000"/>
-                          </a:solidFill>
-                          <a:effectLst/>
-                          <a:latin typeface="Calibri"/>
-                        </a:rPr>
-                        <a:t> $  150.00 </a:t>
-                      </a:r>
-                    </a:p>
-                  </a:txBody>
-                  <a:tcPr marL="9525" marR="9525" marT="9525" marB="0" anchor="b"/>
-                </a:tc>
-                <a:tc>
-                  <a:txBody>
-                    <a:bodyPr/>
-                    <a:lstStyle/>
-                    <a:p>
-                      <a:pPr algn="l" fontAlgn="b"/>
-                      <a:endParaRPr lang="en-US" sz="1100" b="0" i="0" u="none" strike="noStrike">
-                        <a:solidFill>
-                          <a:srgbClr val="000000"/>
-                        </a:solidFill>
-                        <a:effectLst/>
-                        <a:latin typeface="Calibri"/>
-                      </a:endParaRPr>
-                    </a:p>
-                  </a:txBody>
-                  <a:tcPr marL="9525" marR="9525" marT="9525" marB="0" anchor="b"/>
-                </a:tc>
-              </a:tr>
-              <a:tr h="104617">
-                <a:tc>
-                  <a:txBody>
-                    <a:bodyPr/>
-                    <a:lstStyle/>
-                    <a:p>
-                      <a:pPr algn="l" fontAlgn="b"/>
-                      <a:r>
-                        <a:rPr lang="en-US" sz="1100" b="0" i="0" u="none" strike="noStrike">
-                          <a:solidFill>
-                            <a:srgbClr val="000000"/>
-                          </a:solidFill>
-                          <a:effectLst/>
-                          <a:latin typeface="Calibri"/>
-                        </a:rPr>
-                        <a:t>Darlington Array</a:t>
-                      </a:r>
-                    </a:p>
-                  </a:txBody>
-                  <a:tcPr marL="9525" marR="9525" marT="9525" marB="0" anchor="b"/>
-                </a:tc>
-                <a:tc>
-                  <a:txBody>
-                    <a:bodyPr/>
-                    <a:lstStyle/>
-                    <a:p>
-                      <a:pPr algn="r" fontAlgn="b"/>
-                      <a:r>
-                        <a:rPr lang="en-US" sz="1100" b="0" i="0" u="none" strike="noStrike">
-                          <a:solidFill>
-                            <a:srgbClr val="000000"/>
-                          </a:solidFill>
-                          <a:effectLst/>
-                          <a:latin typeface="Calibri"/>
-                        </a:rPr>
-                        <a:t>6</a:t>
-                      </a:r>
-                    </a:p>
-                  </a:txBody>
-                  <a:tcPr marL="9525" marR="9525" marT="9525" marB="0" anchor="b"/>
-                </a:tc>
-                <a:tc>
-                  <a:txBody>
-                    <a:bodyPr/>
-                    <a:lstStyle/>
-                    <a:p>
-                      <a:pPr algn="l" fontAlgn="b"/>
-                      <a:r>
-                        <a:rPr lang="en-US" sz="1100" b="0" i="0" u="none" strike="noStrike">
-                          <a:solidFill>
-                            <a:srgbClr val="000000"/>
-                          </a:solidFill>
-                          <a:effectLst/>
-                          <a:latin typeface="Calibri"/>
-                        </a:rPr>
-                        <a:t> $       2.00 </a:t>
-                      </a:r>
-                    </a:p>
-                  </a:txBody>
-                  <a:tcPr marL="9525" marR="9525" marT="9525" marB="0" anchor="b"/>
-                </a:tc>
-                <a:tc>
-                  <a:txBody>
-                    <a:bodyPr/>
-                    <a:lstStyle/>
-                    <a:p>
-                      <a:pPr algn="l" fontAlgn="b"/>
-                      <a:r>
-                        <a:rPr lang="en-US" sz="1100" b="0" i="0" u="none" strike="noStrike">
-                          <a:solidFill>
-                            <a:srgbClr val="000000"/>
-                          </a:solidFill>
-                          <a:effectLst/>
-                          <a:latin typeface="Calibri"/>
-                        </a:rPr>
-                        <a:t> $       4.43 </a:t>
-                      </a:r>
-                    </a:p>
-                  </a:txBody>
-                  <a:tcPr marL="9525" marR="9525" marT="9525" marB="0" anchor="b"/>
-                </a:tc>
-                <a:tc>
-                  <a:txBody>
-                    <a:bodyPr/>
-                    <a:lstStyle/>
-                    <a:p>
-                      <a:pPr algn="l" fontAlgn="b"/>
-                      <a:r>
-                        <a:rPr lang="en-US" sz="1100" b="0" i="0" u="none" strike="noStrike">
-                          <a:solidFill>
-                            <a:srgbClr val="000000"/>
-                          </a:solidFill>
-                          <a:effectLst/>
-                          <a:latin typeface="Calibri"/>
-                        </a:rPr>
-                        <a:t> $    16.43 </a:t>
-                      </a:r>
-                    </a:p>
-                  </a:txBody>
-                  <a:tcPr marL="9525" marR="9525" marT="9525" marB="0" anchor="b"/>
-                </a:tc>
-                <a:tc>
-                  <a:txBody>
-                    <a:bodyPr/>
-                    <a:lstStyle/>
-                    <a:p>
-                      <a:pPr algn="l" fontAlgn="b"/>
-                      <a:endParaRPr lang="en-US" sz="1100" b="0" i="0" u="none" strike="noStrike">
-                        <a:solidFill>
-                          <a:srgbClr val="000000"/>
-                        </a:solidFill>
-                        <a:effectLst/>
-                        <a:latin typeface="Calibri"/>
-                      </a:endParaRPr>
-                    </a:p>
-                  </a:txBody>
-                  <a:tcPr marL="9525" marR="9525" marT="9525" marB="0" anchor="b"/>
-                </a:tc>
-              </a:tr>
-              <a:tr h="104617">
-                <a:tc>
-                  <a:txBody>
-                    <a:bodyPr/>
-                    <a:lstStyle/>
-                    <a:p>
-                      <a:pPr algn="l" fontAlgn="b"/>
-                      <a:r>
-                        <a:rPr lang="en-US" sz="1100" b="0" i="0" u="none" strike="noStrike">
-                          <a:solidFill>
-                            <a:srgbClr val="000000"/>
-                          </a:solidFill>
-                          <a:effectLst/>
-                          <a:latin typeface="Calibri"/>
-                        </a:rPr>
-                        <a:t>USB external HDD</a:t>
-                      </a:r>
-                    </a:p>
-                  </a:txBody>
-                  <a:tcPr marL="9525" marR="9525" marT="9525" marB="0" anchor="b"/>
-                </a:tc>
-                <a:tc>
-                  <a:txBody>
-                    <a:bodyPr/>
-                    <a:lstStyle/>
-                    <a:p>
-                      <a:pPr algn="r" fontAlgn="b"/>
-                      <a:r>
-                        <a:rPr lang="en-US" sz="1100" b="0" i="0" u="none" strike="noStrike">
-                          <a:solidFill>
-                            <a:srgbClr val="000000"/>
-                          </a:solidFill>
-                          <a:effectLst/>
-                          <a:latin typeface="Calibri"/>
-                        </a:rPr>
-                        <a:t>1</a:t>
-                      </a:r>
-                    </a:p>
-                  </a:txBody>
-                  <a:tcPr marL="9525" marR="9525" marT="9525" marB="0" anchor="b"/>
-                </a:tc>
-                <a:tc>
-                  <a:txBody>
-                    <a:bodyPr/>
-                    <a:lstStyle/>
-                    <a:p>
-                      <a:pPr algn="l" fontAlgn="b"/>
-                      <a:r>
-                        <a:rPr lang="en-US" sz="1100" b="0" i="0" u="none" strike="noStrike">
-                          <a:solidFill>
-                            <a:srgbClr val="000000"/>
-                          </a:solidFill>
-                          <a:effectLst/>
-                          <a:latin typeface="Calibri"/>
-                        </a:rPr>
-                        <a:t> $    28.00 </a:t>
-                      </a:r>
-                    </a:p>
-                  </a:txBody>
-                  <a:tcPr marL="9525" marR="9525" marT="9525" marB="0" anchor="b"/>
-                </a:tc>
-                <a:tc>
-                  <a:txBody>
-                    <a:bodyPr/>
-                    <a:lstStyle/>
-                    <a:p>
-                      <a:pPr algn="l" fontAlgn="b"/>
-                      <a:r>
-                        <a:rPr lang="en-US" sz="1100" b="0" i="0" u="none" strike="noStrike">
-                          <a:solidFill>
-                            <a:srgbClr val="000000"/>
-                          </a:solidFill>
-                          <a:effectLst/>
-                          <a:latin typeface="Calibri"/>
-                        </a:rPr>
-                        <a:t> $       7.49 </a:t>
-                      </a:r>
-                    </a:p>
-                  </a:txBody>
-                  <a:tcPr marL="9525" marR="9525" marT="9525" marB="0" anchor="b"/>
-                </a:tc>
-                <a:tc>
-                  <a:txBody>
-                    <a:bodyPr/>
-                    <a:lstStyle/>
-                    <a:p>
-                      <a:pPr algn="l" fontAlgn="b"/>
-                      <a:r>
-                        <a:rPr lang="en-US" sz="1100" b="0" i="0" u="none" strike="noStrike">
-                          <a:solidFill>
-                            <a:srgbClr val="000000"/>
-                          </a:solidFill>
-                          <a:effectLst/>
-                          <a:latin typeface="Calibri"/>
-                        </a:rPr>
-                        <a:t> $    35.49 </a:t>
-                      </a:r>
-                    </a:p>
-                  </a:txBody>
-                  <a:tcPr marL="9525" marR="9525" marT="9525" marB="0" anchor="b"/>
-                </a:tc>
-                <a:tc>
-                  <a:txBody>
-                    <a:bodyPr/>
-                    <a:lstStyle/>
-                    <a:p>
-                      <a:pPr algn="l" fontAlgn="b"/>
-                      <a:endParaRPr lang="en-US" sz="1100" b="0" i="0" u="none" strike="noStrike">
-                        <a:solidFill>
-                          <a:srgbClr val="000000"/>
-                        </a:solidFill>
-                        <a:effectLst/>
-                        <a:latin typeface="Calibri"/>
-                      </a:endParaRPr>
-                    </a:p>
-                  </a:txBody>
-                  <a:tcPr marL="9525" marR="9525" marT="9525" marB="0" anchor="b"/>
-                </a:tc>
-              </a:tr>
-              <a:tr h="104617">
-                <a:tc>
-                  <a:txBody>
-                    <a:bodyPr/>
-                    <a:lstStyle/>
-                    <a:p>
-                      <a:pPr algn="l" fontAlgn="b"/>
-                      <a:r>
-                        <a:rPr lang="en-US" sz="1100" b="0" i="0" u="none" strike="noStrike">
-                          <a:solidFill>
-                            <a:srgbClr val="000000"/>
-                          </a:solidFill>
-                          <a:effectLst/>
-                          <a:latin typeface="Calibri"/>
-                        </a:rPr>
-                        <a:t>7-Seg I2C </a:t>
-                      </a:r>
-                    </a:p>
-                  </a:txBody>
-                  <a:tcPr marL="9525" marR="9525" marT="9525" marB="0" anchor="b"/>
-                </a:tc>
-                <a:tc>
-                  <a:txBody>
-                    <a:bodyPr/>
-                    <a:lstStyle/>
-                    <a:p>
-                      <a:pPr algn="r" fontAlgn="b"/>
-                      <a:r>
-                        <a:rPr lang="en-US" sz="1100" b="0" i="0" u="none" strike="noStrike">
-                          <a:solidFill>
-                            <a:srgbClr val="000000"/>
-                          </a:solidFill>
-                          <a:effectLst/>
-                          <a:latin typeface="Calibri"/>
-                        </a:rPr>
-                        <a:t>5</a:t>
-                      </a:r>
-                    </a:p>
-                  </a:txBody>
-                  <a:tcPr marL="9525" marR="9525" marT="9525" marB="0" anchor="b"/>
-                </a:tc>
-                <a:tc>
-                  <a:txBody>
-                    <a:bodyPr/>
-                    <a:lstStyle/>
-                    <a:p>
-                      <a:pPr algn="l" fontAlgn="b"/>
-                      <a:r>
-                        <a:rPr lang="en-US" sz="1100" b="0" i="0" u="none" strike="noStrike">
-                          <a:solidFill>
-                            <a:srgbClr val="000000"/>
-                          </a:solidFill>
-                          <a:effectLst/>
-                          <a:latin typeface="Calibri"/>
-                        </a:rPr>
-                        <a:t> $       5.95 </a:t>
-                      </a:r>
-                    </a:p>
-                  </a:txBody>
-                  <a:tcPr marL="9525" marR="9525" marT="9525" marB="0" anchor="b"/>
-                </a:tc>
-                <a:tc>
-                  <a:txBody>
-                    <a:bodyPr/>
-                    <a:lstStyle/>
-                    <a:p>
-                      <a:pPr algn="l" fontAlgn="b"/>
-                      <a:r>
-                        <a:rPr lang="en-US" sz="1100" b="0" i="0" u="none" strike="noStrike">
-                          <a:solidFill>
-                            <a:srgbClr val="000000"/>
-                          </a:solidFill>
-                          <a:effectLst/>
-                          <a:latin typeface="Calibri"/>
-                        </a:rPr>
-                        <a:t> $       7.50 </a:t>
-                      </a:r>
-                    </a:p>
-                  </a:txBody>
-                  <a:tcPr marL="9525" marR="9525" marT="9525" marB="0" anchor="b"/>
-                </a:tc>
-                <a:tc>
-                  <a:txBody>
-                    <a:bodyPr/>
-                    <a:lstStyle/>
-                    <a:p>
-                      <a:pPr algn="l" fontAlgn="b"/>
-                      <a:r>
-                        <a:rPr lang="en-US" sz="1100" b="0" i="0" u="none" strike="noStrike">
-                          <a:solidFill>
-                            <a:srgbClr val="000000"/>
-                          </a:solidFill>
-                          <a:effectLst/>
-                          <a:latin typeface="Calibri"/>
-                        </a:rPr>
-                        <a:t> $    37.25 </a:t>
-                      </a:r>
-                    </a:p>
-                  </a:txBody>
-                  <a:tcPr marL="9525" marR="9525" marT="9525" marB="0" anchor="b"/>
-                </a:tc>
-                <a:tc>
-                  <a:txBody>
-                    <a:bodyPr/>
-                    <a:lstStyle/>
-                    <a:p>
-                      <a:pPr algn="l" fontAlgn="b"/>
-                      <a:endParaRPr lang="en-US" sz="1100" b="0" i="0" u="none" strike="noStrike">
-                        <a:solidFill>
-                          <a:srgbClr val="000000"/>
-                        </a:solidFill>
-                        <a:effectLst/>
-                        <a:latin typeface="Calibri"/>
-                      </a:endParaRPr>
-                    </a:p>
-                  </a:txBody>
-                  <a:tcPr marL="9525" marR="9525" marT="9525" marB="0" anchor="b"/>
-                </a:tc>
-              </a:tr>
-              <a:tr h="104617">
-                <a:tc>
-                  <a:txBody>
-                    <a:bodyPr/>
-                    <a:lstStyle/>
-                    <a:p>
-                      <a:pPr algn="l" fontAlgn="b"/>
-                      <a:r>
-                        <a:rPr lang="en-US" sz="1100" b="0" i="0" u="none" strike="noStrike">
-                          <a:solidFill>
-                            <a:srgbClr val="000000"/>
-                          </a:solidFill>
-                          <a:effectLst/>
-                          <a:latin typeface="Calibri"/>
-                        </a:rPr>
-                        <a:t>Wireless router</a:t>
-                      </a:r>
-                    </a:p>
-                  </a:txBody>
-                  <a:tcPr marL="9525" marR="9525" marT="9525" marB="0" anchor="b"/>
-                </a:tc>
-                <a:tc>
-                  <a:txBody>
-                    <a:bodyPr/>
-                    <a:lstStyle/>
-                    <a:p>
-                      <a:pPr algn="r" fontAlgn="b"/>
-                      <a:r>
-                        <a:rPr lang="en-US" sz="1100" b="0" i="0" u="none" strike="noStrike">
-                          <a:solidFill>
-                            <a:srgbClr val="000000"/>
-                          </a:solidFill>
-                          <a:effectLst/>
-                          <a:latin typeface="Calibri"/>
-                        </a:rPr>
-                        <a:t>1</a:t>
-                      </a:r>
-                    </a:p>
-                  </a:txBody>
-                  <a:tcPr marL="9525" marR="9525" marT="9525" marB="0" anchor="b"/>
-                </a:tc>
-                <a:tc>
-                  <a:txBody>
-                    <a:bodyPr/>
-                    <a:lstStyle/>
-                    <a:p>
-                      <a:pPr algn="l" fontAlgn="b"/>
-                      <a:r>
-                        <a:rPr lang="en-US" sz="1100" b="0" i="0" u="none" strike="noStrike">
-                          <a:solidFill>
-                            <a:srgbClr val="000000"/>
-                          </a:solidFill>
-                          <a:effectLst/>
-                          <a:latin typeface="Calibri"/>
-                        </a:rPr>
-                        <a:t> $    30.00 </a:t>
-                      </a:r>
-                    </a:p>
-                  </a:txBody>
-                  <a:tcPr marL="9525" marR="9525" marT="9525" marB="0" anchor="b"/>
-                </a:tc>
-                <a:tc>
-                  <a:txBody>
-                    <a:bodyPr/>
-                    <a:lstStyle/>
-                    <a:p>
-                      <a:pPr algn="l" fontAlgn="b"/>
-                      <a:r>
-                        <a:rPr lang="en-US" sz="1100" b="0" i="0" u="none" strike="noStrike">
-                          <a:solidFill>
-                            <a:srgbClr val="000000"/>
-                          </a:solidFill>
-                          <a:effectLst/>
-                          <a:latin typeface="Calibri"/>
-                        </a:rPr>
-                        <a:t> $           -   </a:t>
-                      </a:r>
-                    </a:p>
-                  </a:txBody>
-                  <a:tcPr marL="9525" marR="9525" marT="9525" marB="0" anchor="b"/>
-                </a:tc>
-                <a:tc>
-                  <a:txBody>
-                    <a:bodyPr/>
-                    <a:lstStyle/>
-                    <a:p>
-                      <a:pPr algn="l" fontAlgn="b"/>
-                      <a:r>
-                        <a:rPr lang="en-US" sz="1100" b="0" i="0" u="none" strike="noStrike">
-                          <a:solidFill>
-                            <a:srgbClr val="000000"/>
-                          </a:solidFill>
-                          <a:effectLst/>
-                          <a:latin typeface="Calibri"/>
-                        </a:rPr>
-                        <a:t> $    30.00 </a:t>
-                      </a:r>
-                    </a:p>
-                  </a:txBody>
-                  <a:tcPr marL="9525" marR="9525" marT="9525" marB="0" anchor="b"/>
-                </a:tc>
-                <a:tc>
-                  <a:txBody>
-                    <a:bodyPr/>
-                    <a:lstStyle/>
-                    <a:p>
-                      <a:pPr algn="l" fontAlgn="b"/>
-                      <a:endParaRPr lang="en-US" sz="1100" b="0" i="0" u="none" strike="noStrike">
-                        <a:solidFill>
-                          <a:srgbClr val="000000"/>
-                        </a:solidFill>
-                        <a:effectLst/>
-                        <a:latin typeface="Calibri"/>
-                      </a:endParaRPr>
-                    </a:p>
-                  </a:txBody>
-                  <a:tcPr marL="9525" marR="9525" marT="9525" marB="0" anchor="b"/>
-                </a:tc>
-              </a:tr>
-              <a:tr h="104617">
-                <a:tc>
-                  <a:txBody>
-                    <a:bodyPr/>
-                    <a:lstStyle/>
-                    <a:p>
-                      <a:pPr algn="l" fontAlgn="b"/>
-                      <a:r>
-                        <a:rPr lang="en-US" sz="1100" b="0" i="0" u="none" strike="noStrike">
-                          <a:solidFill>
-                            <a:srgbClr val="000000"/>
-                          </a:solidFill>
-                          <a:effectLst/>
-                          <a:latin typeface="Calibri"/>
-                        </a:rPr>
-                        <a:t> </a:t>
-                      </a:r>
-                    </a:p>
-                  </a:txBody>
-                  <a:tcPr marL="9525" marR="9525" marT="9525" marB="0" anchor="b"/>
-                </a:tc>
-                <a:tc>
-                  <a:txBody>
-                    <a:bodyPr/>
-                    <a:lstStyle/>
-                    <a:p>
-                      <a:pPr algn="l" fontAlgn="b"/>
-                      <a:r>
-                        <a:rPr lang="en-US" sz="1100" b="0" i="0" u="none" strike="noStrike">
-                          <a:solidFill>
-                            <a:srgbClr val="000000"/>
-                          </a:solidFill>
-                          <a:effectLst/>
-                          <a:latin typeface="Calibri"/>
-                        </a:rPr>
-                        <a:t> </a:t>
-                      </a:r>
-                    </a:p>
-                  </a:txBody>
-                  <a:tcPr marL="9525" marR="9525" marT="9525" marB="0" anchor="b"/>
-                </a:tc>
-                <a:tc>
-                  <a:txBody>
-                    <a:bodyPr/>
-                    <a:lstStyle/>
-                    <a:p>
-                      <a:pPr algn="l" fontAlgn="b"/>
-                      <a:r>
-                        <a:rPr lang="en-US" sz="1100" b="0" i="0" u="none" strike="noStrike">
-                          <a:solidFill>
-                            <a:srgbClr val="000000"/>
-                          </a:solidFill>
-                          <a:effectLst/>
-                          <a:latin typeface="Calibri"/>
-                        </a:rPr>
-                        <a:t> </a:t>
-                      </a:r>
-                    </a:p>
-                  </a:txBody>
-                  <a:tcPr marL="9525" marR="9525" marT="9525" marB="0" anchor="b"/>
-                </a:tc>
-                <a:tc>
-                  <a:txBody>
-                    <a:bodyPr/>
-                    <a:lstStyle/>
-                    <a:p>
-                      <a:pPr algn="l" fontAlgn="b"/>
-                      <a:r>
-                        <a:rPr lang="en-US" sz="1100" b="0" i="0" u="none" strike="noStrike">
-                          <a:solidFill>
-                            <a:srgbClr val="000000"/>
-                          </a:solidFill>
-                          <a:effectLst/>
-                          <a:latin typeface="Calibri"/>
-                        </a:rPr>
-                        <a:t> </a:t>
-                      </a:r>
-                    </a:p>
-                  </a:txBody>
-                  <a:tcPr marL="9525" marR="9525" marT="9525" marB="0" anchor="b"/>
-                </a:tc>
-                <a:tc>
-                  <a:txBody>
-                    <a:bodyPr/>
-                    <a:lstStyle/>
-                    <a:p>
-                      <a:pPr algn="l" fontAlgn="b"/>
-                      <a:r>
-                        <a:rPr lang="en-US" sz="1100" b="0" i="0" u="none" strike="noStrike">
-                          <a:solidFill>
-                            <a:srgbClr val="000000"/>
-                          </a:solidFill>
-                          <a:effectLst/>
-                          <a:latin typeface="Calibri"/>
-                        </a:rPr>
-                        <a:t> </a:t>
-                      </a:r>
-                    </a:p>
-                  </a:txBody>
-                  <a:tcPr marL="9525" marR="9525" marT="9525" marB="0" anchor="b"/>
-                </a:tc>
-                <a:tc>
-                  <a:txBody>
-                    <a:bodyPr/>
-                    <a:lstStyle/>
-                    <a:p>
-                      <a:pPr algn="l" fontAlgn="b"/>
-                      <a:endParaRPr lang="en-US" sz="1100" b="0" i="0" u="none" strike="noStrike">
-                        <a:solidFill>
-                          <a:srgbClr val="000000"/>
-                        </a:solidFill>
-                        <a:effectLst/>
-                        <a:latin typeface="Calibri"/>
-                      </a:endParaRPr>
-                    </a:p>
-                  </a:txBody>
-                  <a:tcPr marL="9525" marR="9525" marT="9525" marB="0" anchor="b"/>
-                </a:tc>
-              </a:tr>
-              <a:tr h="73691">
-                <a:tc>
-                  <a:txBody>
-                    <a:bodyPr/>
-                    <a:lstStyle/>
-                    <a:p>
-                      <a:pPr algn="l" fontAlgn="b"/>
-                      <a:r>
-                        <a:rPr lang="en-US" sz="1100" b="0" i="0" u="none" strike="noStrike">
-                          <a:solidFill>
-                            <a:srgbClr val="000000"/>
-                          </a:solidFill>
-                          <a:effectLst/>
-                          <a:latin typeface="Calibri"/>
-                        </a:rPr>
-                        <a:t> </a:t>
-                      </a:r>
-                    </a:p>
-                  </a:txBody>
-                  <a:tcPr marL="9525" marR="9525" marT="9525" marB="0" anchor="b"/>
-                </a:tc>
-                <a:tc>
-                  <a:txBody>
-                    <a:bodyPr/>
-                    <a:lstStyle/>
-                    <a:p>
-                      <a:pPr algn="l" fontAlgn="b"/>
-                      <a:r>
-                        <a:rPr lang="en-US" sz="1100" b="0" i="0" u="none" strike="noStrike">
-                          <a:solidFill>
-                            <a:srgbClr val="000000"/>
-                          </a:solidFill>
-                          <a:effectLst/>
-                          <a:latin typeface="Calibri"/>
-                        </a:rPr>
-                        <a:t> </a:t>
-                      </a:r>
-                    </a:p>
-                  </a:txBody>
-                  <a:tcPr marL="9525" marR="9525" marT="9525" marB="0" anchor="b"/>
-                </a:tc>
-                <a:tc>
-                  <a:txBody>
-                    <a:bodyPr/>
-                    <a:lstStyle/>
-                    <a:p>
-                      <a:pPr algn="l" fontAlgn="b"/>
-                      <a:r>
-                        <a:rPr lang="en-US" sz="1100" b="0" i="0" u="none" strike="noStrike">
-                          <a:solidFill>
-                            <a:srgbClr val="000000"/>
-                          </a:solidFill>
-                          <a:effectLst/>
-                          <a:latin typeface="Calibri"/>
-                        </a:rPr>
-                        <a:t> </a:t>
-                      </a:r>
-                    </a:p>
-                  </a:txBody>
-                  <a:tcPr marL="9525" marR="9525" marT="9525" marB="0" anchor="b"/>
-                </a:tc>
-                <a:tc>
-                  <a:txBody>
-                    <a:bodyPr/>
-                    <a:lstStyle/>
-                    <a:p>
-                      <a:pPr algn="l" fontAlgn="b"/>
-                      <a:r>
-                        <a:rPr lang="en-US" sz="1100" b="0" i="0" u="none" strike="noStrike">
-                          <a:solidFill>
-                            <a:srgbClr val="000000"/>
-                          </a:solidFill>
-                          <a:effectLst/>
-                          <a:latin typeface="Calibri"/>
-                        </a:rPr>
-                        <a:t> </a:t>
-                      </a:r>
-                    </a:p>
-                  </a:txBody>
-                  <a:tcPr marL="9525" marR="9525" marT="9525" marB="0" anchor="b"/>
-                </a:tc>
-                <a:tc>
-                  <a:txBody>
-                    <a:bodyPr/>
-                    <a:lstStyle/>
-                    <a:p>
-                      <a:pPr algn="l" fontAlgn="b"/>
-                      <a:r>
-                        <a:rPr lang="en-US" sz="1100" b="0" i="0" u="none" strike="noStrike">
-                          <a:solidFill>
-                            <a:srgbClr val="000000"/>
-                          </a:solidFill>
-                          <a:effectLst/>
-                          <a:latin typeface="Calibri"/>
-                        </a:rPr>
-                        <a:t> $           -   </a:t>
-                      </a:r>
-                    </a:p>
-                  </a:txBody>
-                  <a:tcPr marL="9525" marR="9525" marT="9525" marB="0" anchor="b"/>
-                </a:tc>
-                <a:tc>
-                  <a:txBody>
-                    <a:bodyPr/>
-                    <a:lstStyle/>
-                    <a:p>
-                      <a:pPr algn="l" fontAlgn="b"/>
-                      <a:endParaRPr lang="en-US" sz="1100" b="0" i="0" u="none" strike="noStrike">
-                        <a:solidFill>
-                          <a:srgbClr val="000000"/>
-                        </a:solidFill>
-                        <a:effectLst/>
-                        <a:latin typeface="Calibri"/>
-                      </a:endParaRPr>
-                    </a:p>
-                  </a:txBody>
-                  <a:tcPr marL="9525" marR="9525" marT="9525" marB="0" anchor="b"/>
-                </a:tc>
-              </a:tr>
-              <a:tr h="0">
-                <a:tc gridSpan="5">
-                  <a:txBody>
-                    <a:bodyPr/>
-                    <a:lstStyle/>
-                    <a:p>
-                      <a:pPr algn="ctr" fontAlgn="b"/>
-                      <a:r>
-                        <a:rPr lang="en-US" sz="1100" b="1" i="0" u="none" strike="noStrike">
-                          <a:solidFill>
-                            <a:srgbClr val="000000"/>
-                          </a:solidFill>
-                          <a:effectLst/>
-                          <a:latin typeface="Calibri"/>
-                        </a:rPr>
-                        <a:t>Hydraulics</a:t>
-                      </a:r>
-                    </a:p>
-                  </a:txBody>
-                  <a:tcPr marL="9525" marR="9525" marT="9525" marB="0" anchor="b"/>
-                </a:tc>
-                <a:tc hMerge="1">
-                  <a:txBody>
-                    <a:bodyPr/>
-                    <a:lstStyle/>
-                    <a:p>
-                      <a:endParaRPr lang="en-US"/>
-                    </a:p>
-                  </a:txBody>
-                  <a:tcPr/>
-                </a:tc>
-                <a:tc hMerge="1">
-                  <a:txBody>
-                    <a:bodyPr/>
-                    <a:lstStyle/>
-                    <a:p>
-                      <a:endParaRPr lang="en-US"/>
-                    </a:p>
-                  </a:txBody>
-                  <a:tcPr/>
-                </a:tc>
-                <a:tc hMerge="1">
-                  <a:txBody>
-                    <a:bodyPr/>
-                    <a:lstStyle/>
-                    <a:p>
-                      <a:endParaRPr lang="en-US"/>
-                    </a:p>
-                  </a:txBody>
-                  <a:tcPr/>
-                </a:tc>
-                <a:tc hMerge="1">
-                  <a:txBody>
-                    <a:bodyPr/>
-                    <a:lstStyle/>
-                    <a:p>
-                      <a:endParaRPr lang="en-US"/>
-                    </a:p>
-                  </a:txBody>
-                  <a:tcPr/>
-                </a:tc>
-                <a:tc>
-                  <a:txBody>
-                    <a:bodyPr/>
-                    <a:lstStyle/>
-                    <a:p>
-                      <a:pPr algn="l" fontAlgn="b"/>
-                      <a:r>
-                        <a:rPr lang="en-US" sz="1100" b="1" i="0" u="none" strike="noStrike">
-                          <a:solidFill>
-                            <a:srgbClr val="000000"/>
-                          </a:solidFill>
-                          <a:effectLst/>
-                          <a:latin typeface="Calibri"/>
-                        </a:rPr>
-                        <a:t> $  1,676.16 </a:t>
-                      </a:r>
-                    </a:p>
-                  </a:txBody>
-                  <a:tcPr marL="9525" marR="9525" marT="9525" marB="0" anchor="b"/>
-                </a:tc>
-              </a:tr>
-              <a:tr h="104617">
-                <a:tc>
-                  <a:txBody>
-                    <a:bodyPr/>
-                    <a:lstStyle/>
-                    <a:p>
-                      <a:pPr algn="l" fontAlgn="b"/>
-                      <a:r>
-                        <a:rPr lang="en-US" sz="1100" b="0" i="0" u="none" strike="noStrike">
-                          <a:solidFill>
-                            <a:srgbClr val="000000"/>
-                          </a:solidFill>
-                          <a:effectLst/>
-                          <a:latin typeface="Calibri"/>
-                        </a:rPr>
-                        <a:t>Pump</a:t>
-                      </a:r>
-                    </a:p>
-                  </a:txBody>
-                  <a:tcPr marL="9525" marR="9525" marT="9525" marB="0" anchor="b"/>
-                </a:tc>
-                <a:tc>
-                  <a:txBody>
-                    <a:bodyPr/>
-                    <a:lstStyle/>
-                    <a:p>
-                      <a:pPr algn="r" fontAlgn="b"/>
-                      <a:r>
-                        <a:rPr lang="en-US" sz="1100" b="0" i="0" u="none" strike="noStrike">
-                          <a:solidFill>
-                            <a:srgbClr val="000000"/>
-                          </a:solidFill>
-                          <a:effectLst/>
-                          <a:latin typeface="Calibri"/>
-                        </a:rPr>
-                        <a:t>1</a:t>
-                      </a:r>
-                    </a:p>
-                  </a:txBody>
-                  <a:tcPr marL="9525" marR="9525" marT="9525" marB="0" anchor="b"/>
-                </a:tc>
-                <a:tc>
-                  <a:txBody>
-                    <a:bodyPr/>
-                    <a:lstStyle/>
-                    <a:p>
-                      <a:pPr algn="l" fontAlgn="b"/>
-                      <a:r>
-                        <a:rPr lang="en-US" sz="1100" b="0" i="0" u="none" strike="noStrike">
-                          <a:solidFill>
-                            <a:srgbClr val="000000"/>
-                          </a:solidFill>
-                          <a:effectLst/>
-                          <a:latin typeface="Calibri"/>
-                        </a:rPr>
-                        <a:t> $  171.75 </a:t>
-                      </a:r>
-                    </a:p>
-                  </a:txBody>
-                  <a:tcPr marL="9525" marR="9525" marT="9525" marB="0" anchor="b"/>
-                </a:tc>
-                <a:tc>
-                  <a:txBody>
-                    <a:bodyPr/>
-                    <a:lstStyle/>
-                    <a:p>
-                      <a:pPr algn="l" fontAlgn="b"/>
-                      <a:r>
-                        <a:rPr lang="en-US" sz="1100" b="0" i="0" u="none" strike="noStrike">
-                          <a:solidFill>
-                            <a:srgbClr val="000000"/>
-                          </a:solidFill>
-                          <a:effectLst/>
-                          <a:latin typeface="Calibri"/>
-                        </a:rPr>
-                        <a:t> $    24.32 </a:t>
-                      </a:r>
-                    </a:p>
-                  </a:txBody>
-                  <a:tcPr marL="9525" marR="9525" marT="9525" marB="0" anchor="b"/>
-                </a:tc>
-                <a:tc>
-                  <a:txBody>
-                    <a:bodyPr/>
-                    <a:lstStyle/>
-                    <a:p>
-                      <a:pPr algn="l" fontAlgn="b"/>
-                      <a:r>
-                        <a:rPr lang="en-US" sz="1100" b="0" i="0" u="none" strike="noStrike">
-                          <a:solidFill>
-                            <a:srgbClr val="000000"/>
-                          </a:solidFill>
-                          <a:effectLst/>
-                          <a:latin typeface="Calibri"/>
-                        </a:rPr>
-                        <a:t> $  196.07 </a:t>
-                      </a:r>
-                    </a:p>
-                  </a:txBody>
-                  <a:tcPr marL="9525" marR="9525" marT="9525" marB="0" anchor="b"/>
-                </a:tc>
-                <a:tc>
-                  <a:txBody>
-                    <a:bodyPr/>
-                    <a:lstStyle/>
-                    <a:p>
-                      <a:pPr algn="l" fontAlgn="b"/>
-                      <a:endParaRPr lang="en-US" sz="1100" b="0" i="0" u="none" strike="noStrike">
-                        <a:solidFill>
-                          <a:srgbClr val="000000"/>
-                        </a:solidFill>
-                        <a:effectLst/>
-                        <a:latin typeface="Calibri"/>
-                      </a:endParaRPr>
-                    </a:p>
-                  </a:txBody>
-                  <a:tcPr marL="9525" marR="9525" marT="9525" marB="0" anchor="b"/>
-                </a:tc>
-              </a:tr>
-              <a:tr h="104617">
-                <a:tc>
-                  <a:txBody>
-                    <a:bodyPr/>
-                    <a:lstStyle/>
-                    <a:p>
-                      <a:pPr algn="l" fontAlgn="b"/>
-                      <a:r>
-                        <a:rPr lang="en-US" sz="1100" b="0" i="0" u="none" strike="noStrike">
-                          <a:solidFill>
-                            <a:srgbClr val="000000"/>
-                          </a:solidFill>
-                          <a:effectLst/>
-                          <a:latin typeface="Calibri"/>
-                        </a:rPr>
-                        <a:t>Motor</a:t>
-                      </a:r>
-                    </a:p>
-                  </a:txBody>
-                  <a:tcPr marL="9525" marR="9525" marT="9525" marB="0" anchor="b"/>
-                </a:tc>
-                <a:tc>
-                  <a:txBody>
-                    <a:bodyPr/>
-                    <a:lstStyle/>
-                    <a:p>
-                      <a:pPr algn="r" fontAlgn="b"/>
-                      <a:r>
-                        <a:rPr lang="en-US" sz="1100" b="0" i="0" u="none" strike="noStrike">
-                          <a:solidFill>
-                            <a:srgbClr val="000000"/>
-                          </a:solidFill>
-                          <a:effectLst/>
-                          <a:latin typeface="Calibri"/>
-                        </a:rPr>
-                        <a:t>1</a:t>
-                      </a:r>
-                    </a:p>
-                  </a:txBody>
-                  <a:tcPr marL="9525" marR="9525" marT="9525" marB="0" anchor="b"/>
-                </a:tc>
-                <a:tc>
-                  <a:txBody>
-                    <a:bodyPr/>
-                    <a:lstStyle/>
-                    <a:p>
-                      <a:pPr algn="l" fontAlgn="b"/>
-                      <a:r>
-                        <a:rPr lang="en-US" sz="1100" b="0" i="0" u="none" strike="noStrike">
-                          <a:solidFill>
-                            <a:srgbClr val="000000"/>
-                          </a:solidFill>
-                          <a:effectLst/>
-                          <a:latin typeface="Calibri"/>
-                        </a:rPr>
-                        <a:t> $  123.00 </a:t>
-                      </a:r>
-                    </a:p>
-                  </a:txBody>
-                  <a:tcPr marL="9525" marR="9525" marT="9525" marB="0" anchor="b"/>
-                </a:tc>
-                <a:tc>
-                  <a:txBody>
-                    <a:bodyPr/>
-                    <a:lstStyle/>
-                    <a:p>
-                      <a:pPr algn="l" fontAlgn="b"/>
-                      <a:r>
-                        <a:rPr lang="en-US" sz="1100" b="0" i="0" u="none" strike="noStrike">
-                          <a:solidFill>
-                            <a:srgbClr val="000000"/>
-                          </a:solidFill>
-                          <a:effectLst/>
-                          <a:latin typeface="Calibri"/>
-                        </a:rPr>
-                        <a:t> $           -   </a:t>
-                      </a:r>
-                    </a:p>
-                  </a:txBody>
-                  <a:tcPr marL="9525" marR="9525" marT="9525" marB="0" anchor="b"/>
-                </a:tc>
-                <a:tc>
-                  <a:txBody>
-                    <a:bodyPr/>
-                    <a:lstStyle/>
-                    <a:p>
-                      <a:pPr algn="l" fontAlgn="b"/>
-                      <a:r>
-                        <a:rPr lang="en-US" sz="1100" b="0" i="0" u="none" strike="noStrike">
-                          <a:solidFill>
-                            <a:srgbClr val="000000"/>
-                          </a:solidFill>
-                          <a:effectLst/>
-                          <a:latin typeface="Calibri"/>
-                        </a:rPr>
-                        <a:t> $  123.00 </a:t>
-                      </a:r>
-                    </a:p>
-                  </a:txBody>
-                  <a:tcPr marL="9525" marR="9525" marT="9525" marB="0" anchor="b"/>
-                </a:tc>
-                <a:tc>
-                  <a:txBody>
-                    <a:bodyPr/>
-                    <a:lstStyle/>
-                    <a:p>
-                      <a:pPr algn="l" fontAlgn="b"/>
-                      <a:endParaRPr lang="en-US" sz="1100" b="0" i="0" u="none" strike="noStrike">
-                        <a:solidFill>
-                          <a:srgbClr val="000000"/>
-                        </a:solidFill>
-                        <a:effectLst/>
-                        <a:latin typeface="Calibri"/>
-                      </a:endParaRPr>
-                    </a:p>
-                  </a:txBody>
-                  <a:tcPr marL="9525" marR="9525" marT="9525" marB="0" anchor="b"/>
-                </a:tc>
-              </a:tr>
-              <a:tr h="104617">
-                <a:tc>
-                  <a:txBody>
-                    <a:bodyPr/>
-                    <a:lstStyle/>
-                    <a:p>
-                      <a:pPr algn="l" fontAlgn="b"/>
-                      <a:r>
-                        <a:rPr lang="en-US" sz="1100" b="0" i="0" u="none" strike="noStrike">
-                          <a:solidFill>
-                            <a:srgbClr val="000000"/>
-                          </a:solidFill>
-                          <a:effectLst/>
-                          <a:latin typeface="Calibri"/>
-                        </a:rPr>
-                        <a:t>Cylinder</a:t>
-                      </a:r>
-                    </a:p>
-                  </a:txBody>
-                  <a:tcPr marL="9525" marR="9525" marT="9525" marB="0" anchor="b"/>
-                </a:tc>
-                <a:tc>
-                  <a:txBody>
-                    <a:bodyPr/>
-                    <a:lstStyle/>
-                    <a:p>
-                      <a:pPr algn="r" fontAlgn="b"/>
-                      <a:r>
-                        <a:rPr lang="en-US" sz="1100" b="0" i="0" u="none" strike="noStrike">
-                          <a:solidFill>
-                            <a:srgbClr val="000000"/>
-                          </a:solidFill>
-                          <a:effectLst/>
-                          <a:latin typeface="Calibri"/>
-                        </a:rPr>
-                        <a:t>1</a:t>
-                      </a:r>
-                    </a:p>
-                  </a:txBody>
-                  <a:tcPr marL="9525" marR="9525" marT="9525" marB="0" anchor="b"/>
-                </a:tc>
-                <a:tc>
-                  <a:txBody>
-                    <a:bodyPr/>
-                    <a:lstStyle/>
-                    <a:p>
-                      <a:pPr algn="l" fontAlgn="b"/>
-                      <a:r>
-                        <a:rPr lang="en-US" sz="1100" b="0" i="0" u="none" strike="noStrike">
-                          <a:solidFill>
-                            <a:srgbClr val="000000"/>
-                          </a:solidFill>
-                          <a:effectLst/>
-                          <a:latin typeface="Calibri"/>
-                        </a:rPr>
-                        <a:t> $  236.50 </a:t>
-                      </a:r>
-                    </a:p>
-                  </a:txBody>
-                  <a:tcPr marL="9525" marR="9525" marT="9525" marB="0" anchor="b"/>
-                </a:tc>
-                <a:tc>
-                  <a:txBody>
-                    <a:bodyPr/>
-                    <a:lstStyle/>
-                    <a:p>
-                      <a:pPr algn="l" fontAlgn="b"/>
-                      <a:r>
-                        <a:rPr lang="en-US" sz="1100" b="0" i="0" u="none" strike="noStrike">
-                          <a:solidFill>
-                            <a:srgbClr val="000000"/>
-                          </a:solidFill>
-                          <a:effectLst/>
-                          <a:latin typeface="Calibri"/>
-                        </a:rPr>
-                        <a:t> $           -   </a:t>
-                      </a:r>
-                    </a:p>
-                  </a:txBody>
-                  <a:tcPr marL="9525" marR="9525" marT="9525" marB="0" anchor="b"/>
-                </a:tc>
-                <a:tc>
-                  <a:txBody>
-                    <a:bodyPr/>
-                    <a:lstStyle/>
-                    <a:p>
-                      <a:pPr algn="l" fontAlgn="b"/>
-                      <a:r>
-                        <a:rPr lang="en-US" sz="1100" b="0" i="0" u="none" strike="noStrike">
-                          <a:solidFill>
-                            <a:srgbClr val="000000"/>
-                          </a:solidFill>
-                          <a:effectLst/>
-                          <a:latin typeface="Calibri"/>
-                        </a:rPr>
-                        <a:t> $  236.50 </a:t>
-                      </a:r>
-                    </a:p>
-                  </a:txBody>
-                  <a:tcPr marL="9525" marR="9525" marT="9525" marB="0" anchor="b"/>
-                </a:tc>
-                <a:tc>
-                  <a:txBody>
-                    <a:bodyPr/>
-                    <a:lstStyle/>
-                    <a:p>
-                      <a:pPr algn="l" fontAlgn="b"/>
-                      <a:endParaRPr lang="en-US" sz="1100" b="0" i="0" u="none" strike="noStrike">
-                        <a:solidFill>
-                          <a:srgbClr val="000000"/>
-                        </a:solidFill>
-                        <a:effectLst/>
-                        <a:latin typeface="Calibri"/>
-                      </a:endParaRPr>
-                    </a:p>
-                  </a:txBody>
-                  <a:tcPr marL="9525" marR="9525" marT="9525" marB="0" anchor="b"/>
-                </a:tc>
-              </a:tr>
-              <a:tr h="104617">
-                <a:tc>
-                  <a:txBody>
-                    <a:bodyPr/>
-                    <a:lstStyle/>
-                    <a:p>
-                      <a:pPr algn="l" fontAlgn="b"/>
-                      <a:r>
-                        <a:rPr lang="en-US" sz="1100" b="0" i="0" u="none" strike="noStrike">
-                          <a:solidFill>
-                            <a:srgbClr val="000000"/>
-                          </a:solidFill>
-                          <a:effectLst/>
-                          <a:latin typeface="Calibri"/>
-                        </a:rPr>
-                        <a:t>Sensor (0-5V)</a:t>
-                      </a:r>
-                    </a:p>
-                  </a:txBody>
-                  <a:tcPr marL="9525" marR="9525" marT="9525" marB="0" anchor="b"/>
-                </a:tc>
-                <a:tc>
-                  <a:txBody>
-                    <a:bodyPr/>
-                    <a:lstStyle/>
-                    <a:p>
-                      <a:pPr algn="r" fontAlgn="b"/>
-                      <a:r>
-                        <a:rPr lang="en-US" sz="1100" b="0" i="0" u="none" strike="noStrike">
-                          <a:solidFill>
-                            <a:srgbClr val="000000"/>
-                          </a:solidFill>
-                          <a:effectLst/>
-                          <a:latin typeface="Calibri"/>
-                        </a:rPr>
-                        <a:t>1</a:t>
-                      </a:r>
-                    </a:p>
-                  </a:txBody>
-                  <a:tcPr marL="9525" marR="9525" marT="9525" marB="0" anchor="b"/>
-                </a:tc>
-                <a:tc>
-                  <a:txBody>
-                    <a:bodyPr/>
-                    <a:lstStyle/>
-                    <a:p>
-                      <a:pPr algn="r" fontAlgn="b"/>
-                      <a:r>
-                        <a:rPr lang="en-US" sz="1100" b="0" i="0" u="none" strike="noStrike">
-                          <a:solidFill>
-                            <a:srgbClr val="000000"/>
-                          </a:solidFill>
-                          <a:effectLst/>
-                          <a:latin typeface="Calibri"/>
-                        </a:rPr>
-                        <a:t>$391.50 </a:t>
-                      </a:r>
-                    </a:p>
-                  </a:txBody>
-                  <a:tcPr marL="9525" marR="9525" marT="9525" marB="0" anchor="b"/>
-                </a:tc>
-                <a:tc>
-                  <a:txBody>
-                    <a:bodyPr/>
-                    <a:lstStyle/>
-                    <a:p>
-                      <a:pPr algn="l" fontAlgn="b"/>
-                      <a:r>
-                        <a:rPr lang="en-US" sz="1100" b="0" i="0" u="none" strike="noStrike">
-                          <a:solidFill>
-                            <a:srgbClr val="000000"/>
-                          </a:solidFill>
-                          <a:effectLst/>
-                          <a:latin typeface="Calibri"/>
-                        </a:rPr>
-                        <a:t> $           -   </a:t>
-                      </a:r>
-                    </a:p>
-                  </a:txBody>
-                  <a:tcPr marL="9525" marR="9525" marT="9525" marB="0" anchor="b"/>
-                </a:tc>
-                <a:tc>
-                  <a:txBody>
-                    <a:bodyPr/>
-                    <a:lstStyle/>
-                    <a:p>
-                      <a:pPr algn="l" fontAlgn="b"/>
-                      <a:r>
-                        <a:rPr lang="en-US" sz="1100" b="0" i="0" u="none" strike="noStrike">
-                          <a:solidFill>
-                            <a:srgbClr val="000000"/>
-                          </a:solidFill>
-                          <a:effectLst/>
-                          <a:latin typeface="Calibri"/>
-                        </a:rPr>
-                        <a:t> $  391.50 </a:t>
-                      </a:r>
-                    </a:p>
-                  </a:txBody>
-                  <a:tcPr marL="9525" marR="9525" marT="9525" marB="0" anchor="b"/>
-                </a:tc>
-                <a:tc>
-                  <a:txBody>
-                    <a:bodyPr/>
-                    <a:lstStyle/>
-                    <a:p>
-                      <a:pPr algn="l" fontAlgn="b"/>
-                      <a:endParaRPr lang="en-US" sz="1100" b="0" i="0" u="none" strike="noStrike">
-                        <a:solidFill>
-                          <a:srgbClr val="000000"/>
-                        </a:solidFill>
-                        <a:effectLst/>
-                        <a:latin typeface="Calibri"/>
-                      </a:endParaRPr>
-                    </a:p>
-                  </a:txBody>
-                  <a:tcPr marL="9525" marR="9525" marT="9525" marB="0" anchor="b"/>
-                </a:tc>
-              </a:tr>
-              <a:tr h="104617">
-                <a:tc>
-                  <a:txBody>
-                    <a:bodyPr/>
-                    <a:lstStyle/>
-                    <a:p>
-                      <a:pPr algn="l" fontAlgn="b"/>
-                      <a:r>
-                        <a:rPr lang="en-US" sz="1100" b="0" i="0" u="none" strike="noStrike">
-                          <a:solidFill>
-                            <a:srgbClr val="000000"/>
-                          </a:solidFill>
-                          <a:effectLst/>
-                          <a:latin typeface="Calibri"/>
-                        </a:rPr>
-                        <a:t>Lines</a:t>
-                      </a:r>
-                    </a:p>
-                  </a:txBody>
-                  <a:tcPr marL="9525" marR="9525" marT="9525" marB="0" anchor="b"/>
-                </a:tc>
-                <a:tc>
-                  <a:txBody>
-                    <a:bodyPr/>
-                    <a:lstStyle/>
-                    <a:p>
-                      <a:pPr algn="r" fontAlgn="b"/>
-                      <a:r>
-                        <a:rPr lang="en-US" sz="1100" b="0" i="0" u="none" strike="noStrike">
-                          <a:solidFill>
-                            <a:srgbClr val="000000"/>
-                          </a:solidFill>
-                          <a:effectLst/>
-                          <a:latin typeface="Calibri"/>
-                        </a:rPr>
-                        <a:t>5</a:t>
-                      </a:r>
-                    </a:p>
-                  </a:txBody>
-                  <a:tcPr marL="9525" marR="9525" marT="9525" marB="0" anchor="b"/>
-                </a:tc>
-                <a:tc>
-                  <a:txBody>
-                    <a:bodyPr/>
-                    <a:lstStyle/>
-                    <a:p>
-                      <a:pPr algn="l" fontAlgn="b"/>
-                      <a:r>
-                        <a:rPr lang="en-US" sz="1100" b="0" i="0" u="none" strike="noStrike">
-                          <a:solidFill>
-                            <a:srgbClr val="000000"/>
-                          </a:solidFill>
-                          <a:effectLst/>
-                          <a:latin typeface="Calibri"/>
-                        </a:rPr>
-                        <a:t> $  100.00 </a:t>
-                      </a:r>
-                    </a:p>
-                  </a:txBody>
-                  <a:tcPr marL="9525" marR="9525" marT="9525" marB="0" anchor="b"/>
-                </a:tc>
-                <a:tc>
-                  <a:txBody>
-                    <a:bodyPr/>
-                    <a:lstStyle/>
-                    <a:p>
-                      <a:pPr algn="l" fontAlgn="b"/>
-                      <a:r>
-                        <a:rPr lang="en-US" sz="1100" b="0" i="0" u="none" strike="noStrike">
-                          <a:solidFill>
-                            <a:srgbClr val="000000"/>
-                          </a:solidFill>
-                          <a:effectLst/>
-                          <a:latin typeface="Calibri"/>
-                        </a:rPr>
-                        <a:t> $           -   </a:t>
-                      </a:r>
-                    </a:p>
-                  </a:txBody>
-                  <a:tcPr marL="9525" marR="9525" marT="9525" marB="0" anchor="b"/>
-                </a:tc>
-                <a:tc>
-                  <a:txBody>
-                    <a:bodyPr/>
-                    <a:lstStyle/>
-                    <a:p>
-                      <a:pPr algn="l" fontAlgn="b"/>
-                      <a:r>
-                        <a:rPr lang="en-US" sz="1100" b="0" i="0" u="none" strike="noStrike">
-                          <a:solidFill>
-                            <a:srgbClr val="000000"/>
-                          </a:solidFill>
-                          <a:effectLst/>
-                          <a:latin typeface="Calibri"/>
-                        </a:rPr>
-                        <a:t> $  500.00 </a:t>
-                      </a:r>
-                    </a:p>
-                  </a:txBody>
-                  <a:tcPr marL="9525" marR="9525" marT="9525" marB="0" anchor="b"/>
-                </a:tc>
-                <a:tc>
-                  <a:txBody>
-                    <a:bodyPr/>
-                    <a:lstStyle/>
-                    <a:p>
-                      <a:pPr algn="l" fontAlgn="b"/>
-                      <a:endParaRPr lang="en-US" sz="1100" b="0" i="0" u="none" strike="noStrike">
-                        <a:solidFill>
-                          <a:srgbClr val="000000"/>
-                        </a:solidFill>
-                        <a:effectLst/>
-                        <a:latin typeface="Calibri"/>
-                      </a:endParaRPr>
-                    </a:p>
-                  </a:txBody>
-                  <a:tcPr marL="9525" marR="9525" marT="9525" marB="0" anchor="b"/>
-                </a:tc>
-              </a:tr>
-              <a:tr h="104617">
-                <a:tc>
-                  <a:txBody>
-                    <a:bodyPr/>
-                    <a:lstStyle/>
-                    <a:p>
-                      <a:pPr algn="l" fontAlgn="b"/>
-                      <a:r>
-                        <a:rPr lang="en-US" sz="1100" b="0" i="0" u="none" strike="noStrike">
-                          <a:solidFill>
-                            <a:srgbClr val="000000"/>
-                          </a:solidFill>
-                          <a:effectLst/>
-                          <a:latin typeface="Calibri"/>
-                        </a:rPr>
-                        <a:t>Valve</a:t>
-                      </a:r>
-                    </a:p>
-                  </a:txBody>
-                  <a:tcPr marL="9525" marR="9525" marT="9525" marB="0" anchor="b"/>
-                </a:tc>
-                <a:tc>
-                  <a:txBody>
-                    <a:bodyPr/>
-                    <a:lstStyle/>
-                    <a:p>
-                      <a:pPr algn="r" fontAlgn="b"/>
-                      <a:r>
-                        <a:rPr lang="en-US" sz="1100" b="0" i="0" u="none" strike="noStrike">
-                          <a:solidFill>
-                            <a:srgbClr val="000000"/>
-                          </a:solidFill>
-                          <a:effectLst/>
-                          <a:latin typeface="Calibri"/>
-                        </a:rPr>
-                        <a:t>1</a:t>
-                      </a:r>
-                    </a:p>
-                  </a:txBody>
-                  <a:tcPr marL="9525" marR="9525" marT="9525" marB="0" anchor="b"/>
-                </a:tc>
-                <a:tc>
-                  <a:txBody>
-                    <a:bodyPr/>
-                    <a:lstStyle/>
-                    <a:p>
-                      <a:pPr algn="l" fontAlgn="b"/>
-                      <a:r>
-                        <a:rPr lang="en-US" sz="1100" b="0" i="0" u="none" strike="noStrike">
-                          <a:solidFill>
-                            <a:srgbClr val="000000"/>
-                          </a:solidFill>
-                          <a:effectLst/>
-                          <a:latin typeface="Calibri"/>
-                        </a:rPr>
-                        <a:t> $    85.00 </a:t>
-                      </a:r>
-                    </a:p>
-                  </a:txBody>
-                  <a:tcPr marL="9525" marR="9525" marT="9525" marB="0" anchor="b"/>
-                </a:tc>
-                <a:tc>
-                  <a:txBody>
-                    <a:bodyPr/>
-                    <a:lstStyle/>
-                    <a:p>
-                      <a:pPr algn="l" fontAlgn="b"/>
-                      <a:r>
-                        <a:rPr lang="en-US" sz="1100" b="0" i="0" u="none" strike="noStrike">
-                          <a:solidFill>
-                            <a:srgbClr val="000000"/>
-                          </a:solidFill>
-                          <a:effectLst/>
-                          <a:latin typeface="Calibri"/>
-                        </a:rPr>
-                        <a:t> $           -   </a:t>
-                      </a:r>
-                    </a:p>
-                  </a:txBody>
-                  <a:tcPr marL="9525" marR="9525" marT="9525" marB="0" anchor="b"/>
-                </a:tc>
-                <a:tc>
-                  <a:txBody>
-                    <a:bodyPr/>
-                    <a:lstStyle/>
-                    <a:p>
-                      <a:pPr algn="l" fontAlgn="b"/>
-                      <a:r>
-                        <a:rPr lang="en-US" sz="1100" b="0" i="0" u="none" strike="noStrike">
-                          <a:solidFill>
-                            <a:srgbClr val="000000"/>
-                          </a:solidFill>
-                          <a:effectLst/>
-                          <a:latin typeface="Calibri"/>
-                        </a:rPr>
-                        <a:t> $    85.00 </a:t>
-                      </a:r>
-                    </a:p>
-                  </a:txBody>
-                  <a:tcPr marL="9525" marR="9525" marT="9525" marB="0" anchor="b"/>
-                </a:tc>
-                <a:tc>
-                  <a:txBody>
-                    <a:bodyPr/>
-                    <a:lstStyle/>
-                    <a:p>
-                      <a:pPr algn="l" fontAlgn="b"/>
-                      <a:endParaRPr lang="en-US" sz="1100" b="0" i="0" u="none" strike="noStrike">
-                        <a:solidFill>
-                          <a:srgbClr val="000000"/>
-                        </a:solidFill>
-                        <a:effectLst/>
-                        <a:latin typeface="Calibri"/>
-                      </a:endParaRPr>
-                    </a:p>
-                  </a:txBody>
-                  <a:tcPr marL="9525" marR="9525" marT="9525" marB="0" anchor="b"/>
-                </a:tc>
-              </a:tr>
-              <a:tr h="104617">
-                <a:tc>
-                  <a:txBody>
-                    <a:bodyPr/>
-                    <a:lstStyle/>
-                    <a:p>
-                      <a:pPr algn="l" fontAlgn="b"/>
-                      <a:r>
-                        <a:rPr lang="en-US" sz="1100" b="0" i="0" u="none" strike="noStrike">
-                          <a:solidFill>
-                            <a:srgbClr val="000000"/>
-                          </a:solidFill>
-                          <a:effectLst/>
-                          <a:latin typeface="Calibri"/>
-                        </a:rPr>
-                        <a:t>Tank</a:t>
-                      </a:r>
-                    </a:p>
-                  </a:txBody>
-                  <a:tcPr marL="9525" marR="9525" marT="9525" marB="0" anchor="b"/>
-                </a:tc>
-                <a:tc>
-                  <a:txBody>
-                    <a:bodyPr/>
-                    <a:lstStyle/>
-                    <a:p>
-                      <a:pPr algn="r" fontAlgn="b"/>
-                      <a:r>
-                        <a:rPr lang="en-US" sz="1100" b="0" i="0" u="none" strike="noStrike">
-                          <a:solidFill>
-                            <a:srgbClr val="000000"/>
-                          </a:solidFill>
-                          <a:effectLst/>
-                          <a:latin typeface="Calibri"/>
-                        </a:rPr>
-                        <a:t>1</a:t>
-                      </a:r>
-                    </a:p>
-                  </a:txBody>
-                  <a:tcPr marL="9525" marR="9525" marT="9525" marB="0" anchor="b"/>
-                </a:tc>
-                <a:tc>
-                  <a:txBody>
-                    <a:bodyPr/>
-                    <a:lstStyle/>
-                    <a:p>
-                      <a:pPr algn="l" fontAlgn="b"/>
-                      <a:r>
-                        <a:rPr lang="en-US" sz="1100" b="0" i="0" u="none" strike="noStrike">
-                          <a:solidFill>
-                            <a:srgbClr val="000000"/>
-                          </a:solidFill>
-                          <a:effectLst/>
-                          <a:latin typeface="Calibri"/>
-                        </a:rPr>
-                        <a:t> $    70.00 </a:t>
-                      </a:r>
-                    </a:p>
-                  </a:txBody>
-                  <a:tcPr marL="9525" marR="9525" marT="9525" marB="0" anchor="b"/>
-                </a:tc>
-                <a:tc>
-                  <a:txBody>
-                    <a:bodyPr/>
-                    <a:lstStyle/>
-                    <a:p>
-                      <a:pPr algn="l" fontAlgn="b"/>
-                      <a:r>
-                        <a:rPr lang="en-US" sz="1100" b="0" i="0" u="none" strike="noStrike">
-                          <a:solidFill>
-                            <a:srgbClr val="000000"/>
-                          </a:solidFill>
-                          <a:effectLst/>
-                          <a:latin typeface="Calibri"/>
-                        </a:rPr>
-                        <a:t> $           -   </a:t>
-                      </a:r>
-                    </a:p>
-                  </a:txBody>
-                  <a:tcPr marL="9525" marR="9525" marT="9525" marB="0" anchor="b"/>
-                </a:tc>
-                <a:tc>
-                  <a:txBody>
-                    <a:bodyPr/>
-                    <a:lstStyle/>
-                    <a:p>
-                      <a:pPr algn="l" fontAlgn="b"/>
-                      <a:r>
-                        <a:rPr lang="en-US" sz="1100" b="0" i="0" u="none" strike="noStrike">
-                          <a:solidFill>
-                            <a:srgbClr val="000000"/>
-                          </a:solidFill>
-                          <a:effectLst/>
-                          <a:latin typeface="Calibri"/>
-                        </a:rPr>
-                        <a:t> $    70.00 </a:t>
-                      </a:r>
-                    </a:p>
-                  </a:txBody>
-                  <a:tcPr marL="9525" marR="9525" marT="9525" marB="0" anchor="b"/>
-                </a:tc>
-                <a:tc>
-                  <a:txBody>
-                    <a:bodyPr/>
-                    <a:lstStyle/>
-                    <a:p>
-                      <a:pPr algn="l" fontAlgn="b"/>
-                      <a:endParaRPr lang="en-US" sz="1100" b="0" i="0" u="none" strike="noStrike">
-                        <a:solidFill>
-                          <a:srgbClr val="000000"/>
-                        </a:solidFill>
-                        <a:effectLst/>
-                        <a:latin typeface="Calibri"/>
-                      </a:endParaRPr>
-                    </a:p>
-                  </a:txBody>
-                  <a:tcPr marL="9525" marR="9525" marT="9525" marB="0" anchor="b"/>
-                </a:tc>
-              </a:tr>
-              <a:tr h="327366">
-                <a:tc>
-                  <a:txBody>
-                    <a:bodyPr/>
-                    <a:lstStyle/>
-                    <a:p>
-                      <a:pPr algn="l" fontAlgn="b"/>
-                      <a:r>
-                        <a:rPr lang="en-US" sz="1100" b="0" i="0" u="none" strike="noStrike">
-                          <a:solidFill>
-                            <a:srgbClr val="000000"/>
-                          </a:solidFill>
-                          <a:effectLst/>
-                          <a:latin typeface="Calibri"/>
-                        </a:rPr>
-                        <a:t>Filter housing</a:t>
-                      </a:r>
-                    </a:p>
-                  </a:txBody>
-                  <a:tcPr marL="9525" marR="9525" marT="9525" marB="0" anchor="b"/>
-                </a:tc>
-                <a:tc>
-                  <a:txBody>
-                    <a:bodyPr/>
-                    <a:lstStyle/>
-                    <a:p>
-                      <a:pPr algn="r" fontAlgn="b"/>
-                      <a:r>
-                        <a:rPr lang="en-US" sz="1100" b="0" i="0" u="none" strike="noStrike">
-                          <a:solidFill>
-                            <a:srgbClr val="000000"/>
-                          </a:solidFill>
-                          <a:effectLst/>
-                          <a:latin typeface="Calibri"/>
-                        </a:rPr>
-                        <a:t>1</a:t>
-                      </a:r>
-                    </a:p>
-                  </a:txBody>
-                  <a:tcPr marL="9525" marR="9525" marT="9525" marB="0" anchor="b"/>
-                </a:tc>
-                <a:tc>
-                  <a:txBody>
-                    <a:bodyPr/>
-                    <a:lstStyle/>
-                    <a:p>
-                      <a:pPr algn="l" fontAlgn="b"/>
-                      <a:r>
-                        <a:rPr lang="en-US" sz="1100" b="0" i="0" u="none" strike="noStrike">
-                          <a:solidFill>
-                            <a:srgbClr val="000000"/>
-                          </a:solidFill>
-                          <a:effectLst/>
-                          <a:latin typeface="Calibri"/>
-                        </a:rPr>
-                        <a:t> $    40.00 </a:t>
-                      </a:r>
-                    </a:p>
-                  </a:txBody>
-                  <a:tcPr marL="9525" marR="9525" marT="9525" marB="0" anchor="b"/>
-                </a:tc>
-                <a:tc>
-                  <a:txBody>
-                    <a:bodyPr/>
-                    <a:lstStyle/>
-                    <a:p>
-                      <a:pPr algn="l" fontAlgn="b"/>
-                      <a:r>
-                        <a:rPr lang="en-US" sz="1100" b="0" i="0" u="none" strike="noStrike">
-                          <a:solidFill>
-                            <a:srgbClr val="000000"/>
-                          </a:solidFill>
-                          <a:effectLst/>
-                          <a:latin typeface="Calibri"/>
-                        </a:rPr>
-                        <a:t> $           -   </a:t>
-                      </a:r>
-                    </a:p>
-                  </a:txBody>
-                  <a:tcPr marL="9525" marR="9525" marT="9525" marB="0" anchor="b"/>
-                </a:tc>
-                <a:tc>
-                  <a:txBody>
-                    <a:bodyPr/>
-                    <a:lstStyle/>
-                    <a:p>
-                      <a:pPr algn="l" fontAlgn="b"/>
-                      <a:r>
-                        <a:rPr lang="en-US" sz="1100" b="0" i="0" u="none" strike="noStrike">
-                          <a:solidFill>
-                            <a:srgbClr val="000000"/>
-                          </a:solidFill>
-                          <a:effectLst/>
-                          <a:latin typeface="Calibri"/>
-                        </a:rPr>
-                        <a:t> $    40.00 </a:t>
-                      </a:r>
-                    </a:p>
-                  </a:txBody>
-                  <a:tcPr marL="9525" marR="9525" marT="9525" marB="0" anchor="b"/>
-                </a:tc>
-                <a:tc>
-                  <a:txBody>
-                    <a:bodyPr/>
-                    <a:lstStyle/>
-                    <a:p>
-                      <a:pPr algn="l" fontAlgn="b"/>
-                      <a:endParaRPr lang="en-US" sz="1100" b="0" i="0" u="none" strike="noStrike">
-                        <a:solidFill>
-                          <a:srgbClr val="000000"/>
-                        </a:solidFill>
-                        <a:effectLst/>
-                        <a:latin typeface="Calibri"/>
-                      </a:endParaRPr>
-                    </a:p>
-                  </a:txBody>
-                  <a:tcPr marL="9525" marR="9525" marT="9525" marB="0" anchor="b"/>
-                </a:tc>
-              </a:tr>
-              <a:tr h="104617">
-                <a:tc>
-                  <a:txBody>
-                    <a:bodyPr/>
-                    <a:lstStyle/>
-                    <a:p>
-                      <a:pPr algn="l" fontAlgn="b"/>
-                      <a:r>
-                        <a:rPr lang="en-US" sz="1100" b="0" i="0" u="none" strike="noStrike">
-                          <a:solidFill>
-                            <a:srgbClr val="000000"/>
-                          </a:solidFill>
-                          <a:effectLst/>
-                          <a:latin typeface="Calibri"/>
-                        </a:rPr>
-                        <a:t>Filter Cartridge</a:t>
-                      </a:r>
-                    </a:p>
-                  </a:txBody>
-                  <a:tcPr marL="9525" marR="9525" marT="9525" marB="0" anchor="b"/>
-                </a:tc>
-                <a:tc>
-                  <a:txBody>
-                    <a:bodyPr/>
-                    <a:lstStyle/>
-                    <a:p>
-                      <a:pPr algn="r" fontAlgn="b"/>
-                      <a:r>
-                        <a:rPr lang="en-US" sz="1100" b="0" i="0" u="none" strike="noStrike">
-                          <a:solidFill>
-                            <a:srgbClr val="000000"/>
-                          </a:solidFill>
-                          <a:effectLst/>
-                          <a:latin typeface="Calibri"/>
-                        </a:rPr>
-                        <a:t>1</a:t>
-                      </a:r>
-                    </a:p>
-                  </a:txBody>
-                  <a:tcPr marL="9525" marR="9525" marT="9525" marB="0" anchor="b"/>
-                </a:tc>
-                <a:tc>
-                  <a:txBody>
-                    <a:bodyPr/>
-                    <a:lstStyle/>
-                    <a:p>
-                      <a:pPr algn="l" fontAlgn="b"/>
-                      <a:r>
-                        <a:rPr lang="en-US" sz="1100" b="0" i="0" u="none" strike="noStrike">
-                          <a:solidFill>
-                            <a:srgbClr val="000000"/>
-                          </a:solidFill>
-                          <a:effectLst/>
-                          <a:latin typeface="Calibri"/>
-                        </a:rPr>
-                        <a:t> $    20.00 </a:t>
-                      </a:r>
-                    </a:p>
-                  </a:txBody>
-                  <a:tcPr marL="9525" marR="9525" marT="9525" marB="0" anchor="b"/>
-                </a:tc>
-                <a:tc>
-                  <a:txBody>
-                    <a:bodyPr/>
-                    <a:lstStyle/>
-                    <a:p>
-                      <a:pPr algn="l" fontAlgn="b"/>
-                      <a:r>
-                        <a:rPr lang="en-US" sz="1100" b="0" i="0" u="none" strike="noStrike">
-                          <a:solidFill>
-                            <a:srgbClr val="000000"/>
-                          </a:solidFill>
-                          <a:effectLst/>
-                          <a:latin typeface="Calibri"/>
-                        </a:rPr>
-                        <a:t> $           -   </a:t>
-                      </a:r>
-                    </a:p>
-                  </a:txBody>
-                  <a:tcPr marL="9525" marR="9525" marT="9525" marB="0" anchor="b"/>
-                </a:tc>
-                <a:tc>
-                  <a:txBody>
-                    <a:bodyPr/>
-                    <a:lstStyle/>
-                    <a:p>
-                      <a:pPr algn="l" fontAlgn="b"/>
-                      <a:r>
-                        <a:rPr lang="en-US" sz="1100" b="0" i="0" u="none" strike="noStrike">
-                          <a:solidFill>
-                            <a:srgbClr val="000000"/>
-                          </a:solidFill>
-                          <a:effectLst/>
-                          <a:latin typeface="Calibri"/>
-                        </a:rPr>
-                        <a:t> $    20.00 </a:t>
-                      </a:r>
-                    </a:p>
-                  </a:txBody>
-                  <a:tcPr marL="9525" marR="9525" marT="9525" marB="0" anchor="b"/>
-                </a:tc>
-                <a:tc>
-                  <a:txBody>
-                    <a:bodyPr/>
-                    <a:lstStyle/>
-                    <a:p>
-                      <a:pPr algn="l" fontAlgn="b"/>
-                      <a:endParaRPr lang="en-US" sz="1100" b="0" i="0" u="none" strike="noStrike" dirty="0">
-                        <a:solidFill>
-                          <a:srgbClr val="000000"/>
-                        </a:solidFill>
-                        <a:effectLst/>
-                        <a:latin typeface="Calibri"/>
-                      </a:endParaRPr>
-                    </a:p>
-                  </a:txBody>
-                  <a:tcPr marL="9525" marR="9525" marT="9525" marB="0" anchor="b"/>
-                </a:tc>
-              </a:tr>
-              <a:tr h="104617">
-                <a:tc>
-                  <a:txBody>
-                    <a:bodyPr/>
-                    <a:lstStyle/>
-                    <a:p>
-                      <a:pPr algn="l" fontAlgn="b"/>
-                      <a:r>
-                        <a:rPr lang="en-US" sz="1100" b="0" i="0" u="none" strike="noStrike">
-                          <a:solidFill>
-                            <a:srgbClr val="000000"/>
-                          </a:solidFill>
-                          <a:effectLst/>
-                          <a:latin typeface="Calibri"/>
-                        </a:rPr>
-                        <a:t> </a:t>
-                      </a:r>
-                    </a:p>
-                  </a:txBody>
-                  <a:tcPr marL="9525" marR="9525" marT="9525" marB="0" anchor="b"/>
-                </a:tc>
-                <a:tc>
-                  <a:txBody>
-                    <a:bodyPr/>
-                    <a:lstStyle/>
-                    <a:p>
-                      <a:pPr algn="l" fontAlgn="b"/>
-                      <a:r>
-                        <a:rPr lang="en-US" sz="1100" b="0" i="0" u="none" strike="noStrike">
-                          <a:solidFill>
-                            <a:srgbClr val="000000"/>
-                          </a:solidFill>
-                          <a:effectLst/>
-                          <a:latin typeface="Calibri"/>
-                        </a:rPr>
-                        <a:t> </a:t>
-                      </a:r>
-                    </a:p>
-                  </a:txBody>
-                  <a:tcPr marL="9525" marR="9525" marT="9525" marB="0" anchor="b"/>
-                </a:tc>
-                <a:tc>
-                  <a:txBody>
-                    <a:bodyPr/>
-                    <a:lstStyle/>
-                    <a:p>
-                      <a:pPr algn="l" fontAlgn="b"/>
-                      <a:r>
-                        <a:rPr lang="en-US" sz="1100" b="0" i="0" u="none" strike="noStrike">
-                          <a:solidFill>
-                            <a:srgbClr val="000000"/>
-                          </a:solidFill>
-                          <a:effectLst/>
-                          <a:latin typeface="Calibri"/>
-                        </a:rPr>
-                        <a:t> </a:t>
-                      </a:r>
-                    </a:p>
-                  </a:txBody>
-                  <a:tcPr marL="9525" marR="9525" marT="9525" marB="0" anchor="b"/>
-                </a:tc>
-                <a:tc>
-                  <a:txBody>
-                    <a:bodyPr/>
-                    <a:lstStyle/>
-                    <a:p>
-                      <a:pPr algn="l" fontAlgn="b"/>
-                      <a:r>
-                        <a:rPr lang="en-US" sz="1100" b="0" i="0" u="none" strike="noStrike">
-                          <a:solidFill>
-                            <a:srgbClr val="000000"/>
-                          </a:solidFill>
-                          <a:effectLst/>
-                          <a:latin typeface="Calibri"/>
-                        </a:rPr>
-                        <a:t> $           -   </a:t>
-                      </a:r>
-                    </a:p>
-                  </a:txBody>
-                  <a:tcPr marL="9525" marR="9525" marT="9525" marB="0" anchor="b"/>
-                </a:tc>
-                <a:tc>
-                  <a:txBody>
-                    <a:bodyPr/>
-                    <a:lstStyle/>
-                    <a:p>
-                      <a:pPr algn="l" fontAlgn="b"/>
-                      <a:r>
-                        <a:rPr lang="en-US" sz="1100" b="0" i="0" u="none" strike="noStrike">
-                          <a:solidFill>
-                            <a:srgbClr val="000000"/>
-                          </a:solidFill>
-                          <a:effectLst/>
-                          <a:latin typeface="Calibri"/>
-                        </a:rPr>
-                        <a:t> $           -   </a:t>
-                      </a:r>
-                    </a:p>
-                  </a:txBody>
-                  <a:tcPr marL="9525" marR="9525" marT="9525" marB="0" anchor="b"/>
-                </a:tc>
-                <a:tc>
-                  <a:txBody>
-                    <a:bodyPr/>
-                    <a:lstStyle/>
-                    <a:p>
-                      <a:pPr algn="l" fontAlgn="b"/>
-                      <a:endParaRPr lang="en-US" sz="1100" b="0" i="0" u="none" strike="noStrike" dirty="0">
-                        <a:solidFill>
-                          <a:srgbClr val="000000"/>
-                        </a:solidFill>
-                        <a:effectLst/>
-                        <a:latin typeface="Calibri"/>
-                      </a:endParaRPr>
-                    </a:p>
-                  </a:txBody>
-                  <a:tcPr marL="9525" marR="9525" marT="9525" marB="0" anchor="b"/>
-                </a:tc>
-              </a:tr>
-              <a:tr h="104617">
-                <a:tc>
-                  <a:txBody>
-                    <a:bodyPr/>
-                    <a:lstStyle/>
-                    <a:p>
-                      <a:pPr algn="l" fontAlgn="b"/>
-                      <a:endParaRPr lang="en-US" sz="1100" b="0" i="0" u="none" strike="noStrike">
-                        <a:solidFill>
-                          <a:srgbClr val="000000"/>
-                        </a:solidFill>
-                        <a:effectLst/>
-                        <a:latin typeface="Calibri"/>
-                      </a:endParaRPr>
-                    </a:p>
-                  </a:txBody>
-                  <a:tcPr marL="9525" marR="9525" marT="9525" marB="0" anchor="b"/>
-                </a:tc>
-                <a:tc>
-                  <a:txBody>
-                    <a:bodyPr/>
-                    <a:lstStyle/>
-                    <a:p>
-                      <a:pPr algn="l" fontAlgn="b"/>
-                      <a:endParaRPr lang="en-US" sz="1100" b="0" i="0" u="none" strike="noStrike">
-                        <a:solidFill>
-                          <a:srgbClr val="000000"/>
-                        </a:solidFill>
-                        <a:effectLst/>
-                        <a:latin typeface="Calibri"/>
-                      </a:endParaRPr>
-                    </a:p>
-                  </a:txBody>
-                  <a:tcPr marL="9525" marR="9525" marT="9525" marB="0" anchor="b"/>
-                </a:tc>
-                <a:tc>
-                  <a:txBody>
-                    <a:bodyPr/>
-                    <a:lstStyle/>
-                    <a:p>
-                      <a:pPr algn="l" fontAlgn="b"/>
-                      <a:endParaRPr lang="en-US" sz="1100" b="0" i="0" u="none" strike="noStrike">
-                        <a:solidFill>
-                          <a:srgbClr val="000000"/>
-                        </a:solidFill>
-                        <a:effectLst/>
-                        <a:latin typeface="Calibri"/>
-                      </a:endParaRPr>
-                    </a:p>
-                  </a:txBody>
-                  <a:tcPr marL="9525" marR="9525" marT="9525" marB="0" anchor="b"/>
-                </a:tc>
-                <a:tc>
-                  <a:txBody>
-                    <a:bodyPr/>
-                    <a:lstStyle/>
-                    <a:p>
-                      <a:pPr algn="l" fontAlgn="b"/>
-                      <a:endParaRPr lang="en-US" sz="1100" b="0" i="0" u="none" strike="noStrike">
-                        <a:solidFill>
-                          <a:srgbClr val="000000"/>
-                        </a:solidFill>
-                        <a:effectLst/>
-                        <a:latin typeface="Calibri"/>
-                      </a:endParaRPr>
-                    </a:p>
-                  </a:txBody>
-                  <a:tcPr marL="9525" marR="9525" marT="9525" marB="0" anchor="b"/>
-                </a:tc>
-                <a:tc>
-                  <a:txBody>
-                    <a:bodyPr/>
-                    <a:lstStyle/>
-                    <a:p>
-                      <a:pPr algn="l" fontAlgn="b"/>
-                      <a:endParaRPr lang="en-US" sz="1100" b="0" i="0" u="none" strike="noStrike">
-                        <a:solidFill>
-                          <a:srgbClr val="000000"/>
-                        </a:solidFill>
-                        <a:effectLst/>
-                        <a:latin typeface="Calibri"/>
-                      </a:endParaRPr>
-                    </a:p>
-                  </a:txBody>
-                  <a:tcPr marL="9525" marR="9525" marT="9525" marB="0" anchor="b"/>
-                </a:tc>
-                <a:tc>
-                  <a:txBody>
-                    <a:bodyPr/>
-                    <a:lstStyle/>
-                    <a:p>
-                      <a:pPr algn="l" fontAlgn="b"/>
-                      <a:endParaRPr lang="en-US" sz="1100" b="0" i="0" u="none" strike="noStrike" dirty="0">
-                        <a:solidFill>
-                          <a:srgbClr val="000000"/>
-                        </a:solidFill>
-                        <a:effectLst/>
-                        <a:latin typeface="Calibri"/>
-                      </a:endParaRPr>
-                    </a:p>
-                  </a:txBody>
-                  <a:tcPr marL="9525" marR="9525" marT="9525" marB="0" anchor="b"/>
-                </a:tc>
-              </a:tr>
-            </a:tbl>
           </a:graphicData>
         </a:graphic>
       </p:graphicFrame>

</xml_diff>